<commit_message>
Lidt opdateringer til PP
</commit_message>
<xml_diff>
--- a/Præsentation_Eksamen.pptx
+++ b/Præsentation_Eksamen.pptx
@@ -232,7 +232,7 @@
           <a:p>
             <a:fld id="{6AF9F838-B633-4D47-BC11-C4B614E0B93C}" type="datetimeFigureOut">
               <a:rPr lang="da-DK" smtClean="0"/>
-              <a:t>04-01-2017</a:t>
+              <a:t>05-01-2017</a:t>
             </a:fld>
             <a:endParaRPr lang="da-DK"/>
           </a:p>
@@ -583,6 +583,177 @@
 </p:notes>
 </file>
 
+<file path=ppt/notesSlides/notesSlide10.xml><?xml version="1.0" encoding="utf-8"?>
+<p:notes xmlns:a="http://schemas.openxmlformats.org/drawingml/2006/main" xmlns:r="http://schemas.openxmlformats.org/officeDocument/2006/relationships" xmlns:p="http://schemas.openxmlformats.org/presentationml/2006/main">
+  <p:cSld>
+    <p:spTree>
+      <p:nvGrpSpPr>
+        <p:cNvPr id="1" name=""/>
+        <p:cNvGrpSpPr/>
+        <p:nvPr/>
+      </p:nvGrpSpPr>
+      <p:grpSpPr>
+        <a:xfrm>
+          <a:off x="0" y="0"/>
+          <a:ext cx="0" cy="0"/>
+          <a:chOff x="0" y="0"/>
+          <a:chExt cx="0" cy="0"/>
+        </a:xfrm>
+      </p:grpSpPr>
+      <p:sp>
+        <p:nvSpPr>
+          <p:cNvPr id="2" name="Pladsholder til slidebillede 1"/>
+          <p:cNvSpPr>
+            <a:spLocks noGrp="1" noRot="1" noChangeAspect="1"/>
+          </p:cNvSpPr>
+          <p:nvPr>
+            <p:ph type="sldImg"/>
+          </p:nvPr>
+        </p:nvSpPr>
+        <p:spPr/>
+      </p:sp>
+      <p:sp>
+        <p:nvSpPr>
+          <p:cNvPr id="3" name="Pladsholder til noter 2"/>
+          <p:cNvSpPr>
+            <a:spLocks noGrp="1"/>
+          </p:cNvSpPr>
+          <p:nvPr>
+            <p:ph type="body" idx="1"/>
+          </p:nvPr>
+        </p:nvSpPr>
+        <p:spPr/>
+        <p:txBody>
+          <a:bodyPr/>
+          <a:lstStyle/>
+          <a:p>
+            <a:endParaRPr lang="da-DK" dirty="0"/>
+          </a:p>
+        </p:txBody>
+      </p:sp>
+      <p:sp>
+        <p:nvSpPr>
+          <p:cNvPr id="4" name="Pladsholder til slidenummer 3"/>
+          <p:cNvSpPr>
+            <a:spLocks noGrp="1"/>
+          </p:cNvSpPr>
+          <p:nvPr>
+            <p:ph type="sldNum" sz="quarter" idx="10"/>
+          </p:nvPr>
+        </p:nvSpPr>
+        <p:spPr/>
+        <p:txBody>
+          <a:bodyPr/>
+          <a:lstStyle/>
+          <a:p>
+            <a:fld id="{81DAF125-77CF-4549-A25B-16435FA351B7}" type="slidenum">
+              <a:rPr lang="da-DK" smtClean="0"/>
+              <a:t>12</a:t>
+            </a:fld>
+            <a:endParaRPr lang="da-DK"/>
+          </a:p>
+        </p:txBody>
+      </p:sp>
+    </p:spTree>
+    <p:extLst>
+      <p:ext uri="{BB962C8B-B14F-4D97-AF65-F5344CB8AC3E}">
+        <p14:creationId xmlns:p14="http://schemas.microsoft.com/office/powerpoint/2010/main" val="1635502081"/>
+      </p:ext>
+    </p:extLst>
+  </p:cSld>
+  <p:clrMapOvr>
+    <a:masterClrMapping/>
+  </p:clrMapOvr>
+</p:notes>
+</file>
+
+<file path=ppt/notesSlides/notesSlide11.xml><?xml version="1.0" encoding="utf-8"?>
+<p:notes xmlns:a="http://schemas.openxmlformats.org/drawingml/2006/main" xmlns:r="http://schemas.openxmlformats.org/officeDocument/2006/relationships" xmlns:p="http://schemas.openxmlformats.org/presentationml/2006/main">
+  <p:cSld>
+    <p:spTree>
+      <p:nvGrpSpPr>
+        <p:cNvPr id="1" name=""/>
+        <p:cNvGrpSpPr/>
+        <p:nvPr/>
+      </p:nvGrpSpPr>
+      <p:grpSpPr>
+        <a:xfrm>
+          <a:off x="0" y="0"/>
+          <a:ext cx="0" cy="0"/>
+          <a:chOff x="0" y="0"/>
+          <a:chExt cx="0" cy="0"/>
+        </a:xfrm>
+      </p:grpSpPr>
+      <p:sp>
+        <p:nvSpPr>
+          <p:cNvPr id="2" name="Pladsholder til slidebillede 1"/>
+          <p:cNvSpPr>
+            <a:spLocks noGrp="1" noRot="1" noChangeAspect="1"/>
+          </p:cNvSpPr>
+          <p:nvPr>
+            <p:ph type="sldImg"/>
+          </p:nvPr>
+        </p:nvSpPr>
+        <p:spPr/>
+      </p:sp>
+      <p:sp>
+        <p:nvSpPr>
+          <p:cNvPr id="3" name="Pladsholder til noter 2"/>
+          <p:cNvSpPr>
+            <a:spLocks noGrp="1"/>
+          </p:cNvSpPr>
+          <p:nvPr>
+            <p:ph type="body" idx="1"/>
+          </p:nvPr>
+        </p:nvSpPr>
+        <p:spPr/>
+        <p:txBody>
+          <a:bodyPr/>
+          <a:lstStyle/>
+          <a:p>
+            <a:r>
+              <a:rPr lang="da-DK" dirty="0"/>
+              <a:t>Fortæl om vores forbedringer</a:t>
+            </a:r>
+          </a:p>
+        </p:txBody>
+      </p:sp>
+      <p:sp>
+        <p:nvSpPr>
+          <p:cNvPr id="4" name="Pladsholder til slidenummer 3"/>
+          <p:cNvSpPr>
+            <a:spLocks noGrp="1"/>
+          </p:cNvSpPr>
+          <p:nvPr>
+            <p:ph type="sldNum" sz="quarter" idx="10"/>
+          </p:nvPr>
+        </p:nvSpPr>
+        <p:spPr/>
+        <p:txBody>
+          <a:bodyPr/>
+          <a:lstStyle/>
+          <a:p>
+            <a:fld id="{81DAF125-77CF-4549-A25B-16435FA351B7}" type="slidenum">
+              <a:rPr lang="da-DK" smtClean="0"/>
+              <a:t>14</a:t>
+            </a:fld>
+            <a:endParaRPr lang="da-DK"/>
+          </a:p>
+        </p:txBody>
+      </p:sp>
+    </p:spTree>
+    <p:extLst>
+      <p:ext uri="{BB962C8B-B14F-4D97-AF65-F5344CB8AC3E}">
+        <p14:creationId xmlns:p14="http://schemas.microsoft.com/office/powerpoint/2010/main" val="35115869"/>
+      </p:ext>
+    </p:extLst>
+  </p:cSld>
+  <p:clrMapOvr>
+    <a:masterClrMapping/>
+  </p:clrMapOvr>
+</p:notes>
+</file>
+
 <file path=ppt/notesSlides/notesSlide2.xml><?xml version="1.0" encoding="utf-8"?>
 <p:notes xmlns:a="http://schemas.openxmlformats.org/drawingml/2006/main" xmlns:r="http://schemas.openxmlformats.org/officeDocument/2006/relationships" xmlns:p="http://schemas.openxmlformats.org/presentationml/2006/main">
   <p:cSld>
@@ -627,18 +798,6 @@
           <a:bodyPr/>
           <a:lstStyle/>
           <a:p>
-            <a:r>
-              <a:rPr lang="da-DK" dirty="0" err="1"/>
-              <a:t>Proof</a:t>
-            </a:r>
-            <a:r>
-              <a:rPr lang="da-DK" dirty="0"/>
-              <a:t> of </a:t>
-            </a:r>
-            <a:r>
-              <a:rPr lang="da-DK" dirty="0" err="1"/>
-              <a:t>concept</a:t>
-            </a:r>
             <a:endParaRPr lang="da-DK" dirty="0"/>
           </a:p>
         </p:txBody>
@@ -660,7 +819,7 @@
           <a:p>
             <a:fld id="{81DAF125-77CF-4549-A25B-16435FA351B7}" type="slidenum">
               <a:rPr lang="da-DK" smtClean="0"/>
-              <a:t>4</a:t>
+              <a:t>2</a:t>
             </a:fld>
             <a:endParaRPr lang="da-DK"/>
           </a:p>
@@ -669,7 +828,7 @@
     </p:spTree>
     <p:extLst>
       <p:ext uri="{BB962C8B-B14F-4D97-AF65-F5344CB8AC3E}">
-        <p14:creationId xmlns:p14="http://schemas.microsoft.com/office/powerpoint/2010/main" val="587981342"/>
+        <p14:creationId xmlns:p14="http://schemas.microsoft.com/office/powerpoint/2010/main" val="2982809533"/>
       </p:ext>
     </p:extLst>
   </p:cSld>
@@ -744,7 +903,7 @@
           <a:p>
             <a:fld id="{81DAF125-77CF-4549-A25B-16435FA351B7}" type="slidenum">
               <a:rPr lang="da-DK" smtClean="0"/>
-              <a:t>5</a:t>
+              <a:t>3</a:t>
             </a:fld>
             <a:endParaRPr lang="da-DK"/>
           </a:p>
@@ -753,7 +912,7 @@
     </p:spTree>
     <p:extLst>
       <p:ext uri="{BB962C8B-B14F-4D97-AF65-F5344CB8AC3E}">
-        <p14:creationId xmlns:p14="http://schemas.microsoft.com/office/powerpoint/2010/main" val="2705765586"/>
+        <p14:creationId xmlns:p14="http://schemas.microsoft.com/office/powerpoint/2010/main" val="323785671"/>
       </p:ext>
     </p:extLst>
   </p:cSld>
@@ -808,51 +967,26 @@
           <a:lstStyle/>
           <a:p>
             <a:r>
+              <a:rPr lang="da-DK" dirty="0" err="1"/>
+              <a:t>Proof</a:t>
+            </a:r>
+            <a:r>
               <a:rPr lang="da-DK" dirty="0"/>
-              <a:t>Størstedelen af litteraturen konkluderer, at mere forskning er nødvendig på området. Det</a:t>
-            </a:r>
-          </a:p>
-          <a:p>
+              <a:t> of </a:t>
+            </a:r>
+            <a:r>
+              <a:rPr lang="da-DK" dirty="0" err="1"/>
+              <a:t>concept</a:t>
+            </a:r>
             <a:r>
               <a:rPr lang="da-DK" dirty="0"/>
-              <a:t>kan derfor være svært at lave en endelig konklusion på, hvorvidt en udvidelse af screeningsprogrammet</a:t>
-            </a:r>
-          </a:p>
-          <a:p>
-            <a:r>
-              <a:rPr lang="da-DK" dirty="0"/>
-              <a:t>vil være en god idé. Fordelen er, at man ved en kombination af ultralyd og</a:t>
-            </a:r>
-          </a:p>
-          <a:p>
-            <a:r>
-              <a:rPr lang="da-DK" dirty="0"/>
-              <a:t>røntgen kan opdage tidligere stadier af kræft, hvilket er billigere, og overlevelsesprocenten</a:t>
-            </a:r>
-          </a:p>
-          <a:p>
-            <a:r>
-              <a:rPr lang="da-DK" dirty="0"/>
-              <a:t>er højere. Ulemperne er, at der sker overdiagnosticering ved screeninger, og patienter derfor</a:t>
-            </a:r>
-          </a:p>
-          <a:p>
-            <a:r>
-              <a:rPr lang="da-DK" dirty="0"/>
-              <a:t>behandles uden grund. Tilføjelse af ultralydsscanninger til screeningsprogrammet vil øge</a:t>
-            </a:r>
-          </a:p>
-          <a:p>
-            <a:r>
-              <a:rPr lang="da-DK" dirty="0"/>
-              <a:t>omkostningerne og dermed prisen pr. QALY, hvilket sandsynligvis vil betyde, at udvidelse</a:t>
-            </a:r>
-          </a:p>
-          <a:p>
-            <a:r>
-              <a:rPr lang="da-DK" dirty="0"/>
-              <a:t>af screeningsprogrammet ikke er omkostningseffektivt.</a:t>
-            </a:r>
+              <a:t> nævnes her.</a:t>
+            </a:r>
+            <a:r>
+              <a:rPr lang="da-DK" baseline="0" dirty="0"/>
+              <a:t> </a:t>
+            </a:r>
+            <a:endParaRPr lang="da-DK" dirty="0"/>
           </a:p>
         </p:txBody>
       </p:sp>
@@ -873,7 +1007,7 @@
           <a:p>
             <a:fld id="{81DAF125-77CF-4549-A25B-16435FA351B7}" type="slidenum">
               <a:rPr lang="da-DK" smtClean="0"/>
-              <a:t>8</a:t>
+              <a:t>4</a:t>
             </a:fld>
             <a:endParaRPr lang="da-DK"/>
           </a:p>
@@ -882,7 +1016,7 @@
     </p:spTree>
     <p:extLst>
       <p:ext uri="{BB962C8B-B14F-4D97-AF65-F5344CB8AC3E}">
-        <p14:creationId xmlns:p14="http://schemas.microsoft.com/office/powerpoint/2010/main" val="1022816383"/>
+        <p14:creationId xmlns:p14="http://schemas.microsoft.com/office/powerpoint/2010/main" val="587981342"/>
       </p:ext>
     </p:extLst>
   </p:cSld>
@@ -936,30 +1070,6 @@
           <a:bodyPr/>
           <a:lstStyle/>
           <a:p>
-            <a:r>
-              <a:rPr lang="da-DK" dirty="0"/>
-              <a:t>Interesseområder, fremtid, gav mening efter kompetencer </a:t>
-            </a:r>
-            <a:r>
-              <a:rPr lang="da-DK" dirty="0" err="1"/>
-              <a:t>bla</a:t>
-            </a:r>
-            <a:r>
-              <a:rPr lang="da-DK" baseline="0" dirty="0"/>
-              <a:t> </a:t>
-            </a:r>
-            <a:r>
-              <a:rPr lang="da-DK" baseline="0" dirty="0" err="1"/>
-              <a:t>bla</a:t>
-            </a:r>
-            <a:r>
-              <a:rPr lang="da-DK" baseline="0" dirty="0"/>
-              <a:t> </a:t>
-            </a:r>
-            <a:r>
-              <a:rPr lang="da-DK" baseline="0" dirty="0" err="1"/>
-              <a:t>bla</a:t>
-            </a:r>
             <a:endParaRPr lang="da-DK" dirty="0"/>
           </a:p>
         </p:txBody>
@@ -981,7 +1091,7 @@
           <a:p>
             <a:fld id="{81DAF125-77CF-4549-A25B-16435FA351B7}" type="slidenum">
               <a:rPr lang="da-DK" smtClean="0"/>
-              <a:t>9</a:t>
+              <a:t>5</a:t>
             </a:fld>
             <a:endParaRPr lang="da-DK"/>
           </a:p>
@@ -990,7 +1100,7 @@
     </p:spTree>
     <p:extLst>
       <p:ext uri="{BB962C8B-B14F-4D97-AF65-F5344CB8AC3E}">
-        <p14:creationId xmlns:p14="http://schemas.microsoft.com/office/powerpoint/2010/main" val="746107577"/>
+        <p14:creationId xmlns:p14="http://schemas.microsoft.com/office/powerpoint/2010/main" val="2705765586"/>
       </p:ext>
     </p:extLst>
   </p:cSld>
@@ -1044,24 +1154,7 @@
           <a:bodyPr/>
           <a:lstStyle/>
           <a:p>
-            <a:r>
-              <a:rPr lang="da-DK" dirty="0"/>
-              <a:t>Brugerundersøgelser til at finde ud af,</a:t>
-            </a:r>
-            <a:r>
-              <a:rPr lang="da-DK" baseline="0" dirty="0"/>
-              <a:t> hvad vi skal have med som krav</a:t>
-            </a:r>
-          </a:p>
-          <a:p>
-            <a:endParaRPr lang="da-DK" baseline="0" dirty="0"/>
-          </a:p>
-          <a:p>
-            <a:r>
-              <a:rPr lang="da-DK" baseline="0" dirty="0"/>
-              <a:t>UC – 4 styks </a:t>
-            </a:r>
-            <a:endParaRPr lang="da-DK" dirty="0"/>
+            <a:endParaRPr lang="da-DK"/>
           </a:p>
         </p:txBody>
       </p:sp>
@@ -1082,7 +1175,7 @@
           <a:p>
             <a:fld id="{81DAF125-77CF-4549-A25B-16435FA351B7}" type="slidenum">
               <a:rPr lang="da-DK" smtClean="0"/>
-              <a:t>11</a:t>
+              <a:t>7</a:t>
             </a:fld>
             <a:endParaRPr lang="da-DK"/>
           </a:p>
@@ -1091,7 +1184,7 @@
     </p:spTree>
     <p:extLst>
       <p:ext uri="{BB962C8B-B14F-4D97-AF65-F5344CB8AC3E}">
-        <p14:creationId xmlns:p14="http://schemas.microsoft.com/office/powerpoint/2010/main" val="4183857365"/>
+        <p14:creationId xmlns:p14="http://schemas.microsoft.com/office/powerpoint/2010/main" val="4196849113"/>
       </p:ext>
     </p:extLst>
   </p:cSld>
@@ -1145,7 +1238,52 @@
           <a:bodyPr/>
           <a:lstStyle/>
           <a:p>
-            <a:endParaRPr lang="da-DK" dirty="0"/>
+            <a:r>
+              <a:rPr lang="da-DK" dirty="0"/>
+              <a:t>Størstedelen af litteraturen konkluderer, at mere forskning er nødvendig på området. Det</a:t>
+            </a:r>
+          </a:p>
+          <a:p>
+            <a:r>
+              <a:rPr lang="da-DK" dirty="0"/>
+              <a:t>kan derfor være svært at lave en endelig konklusion på, hvorvidt en udvidelse af screeningsprogrammet</a:t>
+            </a:r>
+          </a:p>
+          <a:p>
+            <a:r>
+              <a:rPr lang="da-DK" dirty="0"/>
+              <a:t>vil være en god idé. Fordelen er, at man ved en kombination af ultralyd og</a:t>
+            </a:r>
+          </a:p>
+          <a:p>
+            <a:r>
+              <a:rPr lang="da-DK" dirty="0"/>
+              <a:t>røntgen kan opdage tidligere stadier af kræft, hvilket er billigere, og overlevelsesprocenten</a:t>
+            </a:r>
+          </a:p>
+          <a:p>
+            <a:r>
+              <a:rPr lang="da-DK" dirty="0"/>
+              <a:t>er højere. Ulemperne er, at der sker overdiagnosticering ved screeninger, og patienter derfor</a:t>
+            </a:r>
+          </a:p>
+          <a:p>
+            <a:r>
+              <a:rPr lang="da-DK" dirty="0"/>
+              <a:t>behandles uden grund. Tilføjelse af ultralydsscanninger til screeningsprogrammet vil øge</a:t>
+            </a:r>
+          </a:p>
+          <a:p>
+            <a:r>
+              <a:rPr lang="da-DK" dirty="0"/>
+              <a:t>omkostningerne og dermed prisen pr. QALY, hvilket sandsynligvis vil betyde, at udvidelse</a:t>
+            </a:r>
+          </a:p>
+          <a:p>
+            <a:r>
+              <a:rPr lang="da-DK" dirty="0"/>
+              <a:t>af screeningsprogrammet ikke er omkostningseffektivt.</a:t>
+            </a:r>
           </a:p>
         </p:txBody>
       </p:sp>
@@ -1166,7 +1304,7 @@
           <a:p>
             <a:fld id="{81DAF125-77CF-4549-A25B-16435FA351B7}" type="slidenum">
               <a:rPr lang="da-DK" smtClean="0"/>
-              <a:t>12</a:t>
+              <a:t>8</a:t>
             </a:fld>
             <a:endParaRPr lang="da-DK"/>
           </a:p>
@@ -1175,7 +1313,7 @@
     </p:spTree>
     <p:extLst>
       <p:ext uri="{BB962C8B-B14F-4D97-AF65-F5344CB8AC3E}">
-        <p14:creationId xmlns:p14="http://schemas.microsoft.com/office/powerpoint/2010/main" val="1635502081"/>
+        <p14:creationId xmlns:p14="http://schemas.microsoft.com/office/powerpoint/2010/main" val="1022816383"/>
       </p:ext>
     </p:extLst>
   </p:cSld>
@@ -1231,8 +1369,29 @@
           <a:p>
             <a:r>
               <a:rPr lang="da-DK" dirty="0"/>
-              <a:t>Fortæl om vores forbedringer</a:t>
-            </a:r>
+              <a:t>Interesseområder, fremtid, gav mening efter kompetencer </a:t>
+            </a:r>
+            <a:r>
+              <a:rPr lang="da-DK" dirty="0" err="1"/>
+              <a:t>bla</a:t>
+            </a:r>
+            <a:r>
+              <a:rPr lang="da-DK" baseline="0" dirty="0"/>
+              <a:t> </a:t>
+            </a:r>
+            <a:r>
+              <a:rPr lang="da-DK" baseline="0" dirty="0" err="1"/>
+              <a:t>bla</a:t>
+            </a:r>
+            <a:r>
+              <a:rPr lang="da-DK" baseline="0" dirty="0"/>
+              <a:t> </a:t>
+            </a:r>
+            <a:r>
+              <a:rPr lang="da-DK" baseline="0" dirty="0" err="1"/>
+              <a:t>bla</a:t>
+            </a:r>
+            <a:endParaRPr lang="da-DK" dirty="0"/>
           </a:p>
         </p:txBody>
       </p:sp>
@@ -1253,7 +1412,7 @@
           <a:p>
             <a:fld id="{81DAF125-77CF-4549-A25B-16435FA351B7}" type="slidenum">
               <a:rPr lang="da-DK" smtClean="0"/>
-              <a:t>14</a:t>
+              <a:t>9</a:t>
             </a:fld>
             <a:endParaRPr lang="da-DK"/>
           </a:p>
@@ -1262,7 +1421,108 @@
     </p:spTree>
     <p:extLst>
       <p:ext uri="{BB962C8B-B14F-4D97-AF65-F5344CB8AC3E}">
-        <p14:creationId xmlns:p14="http://schemas.microsoft.com/office/powerpoint/2010/main" val="35115869"/>
+        <p14:creationId xmlns:p14="http://schemas.microsoft.com/office/powerpoint/2010/main" val="746107577"/>
+      </p:ext>
+    </p:extLst>
+  </p:cSld>
+  <p:clrMapOvr>
+    <a:masterClrMapping/>
+  </p:clrMapOvr>
+</p:notes>
+</file>
+
+<file path=ppt/notesSlides/notesSlide9.xml><?xml version="1.0" encoding="utf-8"?>
+<p:notes xmlns:a="http://schemas.openxmlformats.org/drawingml/2006/main" xmlns:r="http://schemas.openxmlformats.org/officeDocument/2006/relationships" xmlns:p="http://schemas.openxmlformats.org/presentationml/2006/main">
+  <p:cSld>
+    <p:spTree>
+      <p:nvGrpSpPr>
+        <p:cNvPr id="1" name=""/>
+        <p:cNvGrpSpPr/>
+        <p:nvPr/>
+      </p:nvGrpSpPr>
+      <p:grpSpPr>
+        <a:xfrm>
+          <a:off x="0" y="0"/>
+          <a:ext cx="0" cy="0"/>
+          <a:chOff x="0" y="0"/>
+          <a:chExt cx="0" cy="0"/>
+        </a:xfrm>
+      </p:grpSpPr>
+      <p:sp>
+        <p:nvSpPr>
+          <p:cNvPr id="2" name="Pladsholder til slidebillede 1"/>
+          <p:cNvSpPr>
+            <a:spLocks noGrp="1" noRot="1" noChangeAspect="1"/>
+          </p:cNvSpPr>
+          <p:nvPr>
+            <p:ph type="sldImg"/>
+          </p:nvPr>
+        </p:nvSpPr>
+        <p:spPr/>
+      </p:sp>
+      <p:sp>
+        <p:nvSpPr>
+          <p:cNvPr id="3" name="Pladsholder til noter 2"/>
+          <p:cNvSpPr>
+            <a:spLocks noGrp="1"/>
+          </p:cNvSpPr>
+          <p:nvPr>
+            <p:ph type="body" idx="1"/>
+          </p:nvPr>
+        </p:nvSpPr>
+        <p:spPr/>
+        <p:txBody>
+          <a:bodyPr/>
+          <a:lstStyle/>
+          <a:p>
+            <a:r>
+              <a:rPr lang="da-DK" dirty="0"/>
+              <a:t>Brugerundersøgelser til at finde ud af,</a:t>
+            </a:r>
+            <a:r>
+              <a:rPr lang="da-DK" baseline="0" dirty="0"/>
+              <a:t> hvad vi skal have med som krav</a:t>
+            </a:r>
+          </a:p>
+          <a:p>
+            <a:endParaRPr lang="da-DK" baseline="0" dirty="0"/>
+          </a:p>
+          <a:p>
+            <a:r>
+              <a:rPr lang="da-DK" baseline="0" dirty="0"/>
+              <a:t>UC – 4 styks </a:t>
+            </a:r>
+            <a:endParaRPr lang="da-DK" dirty="0"/>
+          </a:p>
+        </p:txBody>
+      </p:sp>
+      <p:sp>
+        <p:nvSpPr>
+          <p:cNvPr id="4" name="Pladsholder til slidenummer 3"/>
+          <p:cNvSpPr>
+            <a:spLocks noGrp="1"/>
+          </p:cNvSpPr>
+          <p:nvPr>
+            <p:ph type="sldNum" sz="quarter" idx="10"/>
+          </p:nvPr>
+        </p:nvSpPr>
+        <p:spPr/>
+        <p:txBody>
+          <a:bodyPr/>
+          <a:lstStyle/>
+          <a:p>
+            <a:fld id="{81DAF125-77CF-4549-A25B-16435FA351B7}" type="slidenum">
+              <a:rPr lang="da-DK" smtClean="0"/>
+              <a:t>11</a:t>
+            </a:fld>
+            <a:endParaRPr lang="da-DK"/>
+          </a:p>
+        </p:txBody>
+      </p:sp>
+    </p:spTree>
+    <p:extLst>
+      <p:ext uri="{BB962C8B-B14F-4D97-AF65-F5344CB8AC3E}">
+        <p14:creationId xmlns:p14="http://schemas.microsoft.com/office/powerpoint/2010/main" val="4183857365"/>
       </p:ext>
     </p:extLst>
   </p:cSld>
@@ -1498,7 +1758,7 @@
           <a:p>
             <a:fld id="{ACF1A1B0-862D-4909-A7DB-D8ADA062DFCA}" type="datetimeFigureOut">
               <a:rPr lang="en-US" smtClean="0"/>
-              <a:t>1/4/2017</a:t>
+              <a:t>1/5/2017</a:t>
             </a:fld>
             <a:endParaRPr lang="en-US" dirty="0"/>
           </a:p>
@@ -1707,7 +1967,7 @@
           <a:p>
             <a:fld id="{7B156144-9CB7-4E3A-B87E-A382F9BE05EF}" type="datetimeFigureOut">
               <a:rPr lang="en-US" smtClean="0"/>
-              <a:t>1/4/2017</a:t>
+              <a:t>1/5/2017</a:t>
             </a:fld>
             <a:endParaRPr lang="en-US" dirty="0"/>
           </a:p>
@@ -1963,7 +2223,7 @@
           <a:p>
             <a:fld id="{2643D55F-46AB-4791-9172-4FA8DD3A6A9C}" type="datetimeFigureOut">
               <a:rPr lang="en-US" smtClean="0"/>
-              <a:t>1/4/2017</a:t>
+              <a:t>1/5/2017</a:t>
             </a:fld>
             <a:endParaRPr lang="en-US" dirty="0"/>
           </a:p>
@@ -2133,7 +2393,7 @@
           <a:p>
             <a:fld id="{58026881-8A08-449C-8D73-E5F201F814C1}" type="datetimeFigureOut">
               <a:rPr lang="en-US" smtClean="0"/>
-              <a:t>1/4/2017</a:t>
+              <a:t>1/5/2017</a:t>
             </a:fld>
             <a:endParaRPr lang="en-US" dirty="0"/>
           </a:p>
@@ -2476,7 +2736,7 @@
           <a:p>
             <a:fld id="{1BEB5A5E-0C07-4E93-A112-D37B4D166B30}" type="datetimeFigureOut">
               <a:rPr lang="en-US" smtClean="0"/>
-              <a:t>1/4/2017</a:t>
+              <a:t>1/5/2017</a:t>
             </a:fld>
             <a:endParaRPr lang="en-US" dirty="0"/>
           </a:p>
@@ -2751,7 +3011,7 @@
           <a:p>
             <a:fld id="{9E1F71C5-DC57-4358-A1EA-30C08AF6E3C5}" type="datetimeFigureOut">
               <a:rPr lang="en-US" smtClean="0"/>
-              <a:t>1/4/2017</a:t>
+              <a:t>1/5/2017</a:t>
             </a:fld>
             <a:endParaRPr lang="en-US" dirty="0"/>
           </a:p>
@@ -3130,7 +3390,7 @@
           <a:p>
             <a:fld id="{12571DBA-DE60-4731-B773-47AAA185C143}" type="datetimeFigureOut">
               <a:rPr lang="en-US" smtClean="0"/>
-              <a:t>1/4/2017</a:t>
+              <a:t>1/5/2017</a:t>
             </a:fld>
             <a:endParaRPr lang="en-US" dirty="0"/>
           </a:p>
@@ -3248,7 +3508,7 @@
           <a:p>
             <a:fld id="{4F170639-886C-4FCF-9EAB-ABB5DA3F3F4A}" type="datetimeFigureOut">
               <a:rPr lang="en-US" smtClean="0"/>
-              <a:t>1/4/2017</a:t>
+              <a:t>1/5/2017</a:t>
             </a:fld>
             <a:endParaRPr lang="en-US" dirty="0"/>
           </a:p>
@@ -3419,7 +3679,7 @@
           <a:p>
             <a:fld id="{34C4A628-C83B-4C66-83F4-1711CE3738FD}" type="datetimeFigureOut">
               <a:rPr lang="en-US" smtClean="0"/>
-              <a:t>1/4/2017</a:t>
+              <a:t>1/5/2017</a:t>
             </a:fld>
             <a:endParaRPr lang="en-US" dirty="0"/>
           </a:p>
@@ -3773,7 +4033,7 @@
           <a:p>
             <a:fld id="{B88C1D73-9400-43CA-A37F-F9B7D00DE14C}" type="datetimeFigureOut">
               <a:rPr lang="en-US" smtClean="0"/>
-              <a:t>1/4/2017</a:t>
+              <a:t>1/5/2017</a:t>
             </a:fld>
             <a:endParaRPr lang="en-US" dirty="0"/>
           </a:p>
@@ -4150,7 +4410,7 @@
           <a:p>
             <a:fld id="{188B7711-B905-4633-B4D7-6F3A49A2E7D9}" type="datetimeFigureOut">
               <a:rPr lang="en-US" smtClean="0"/>
-              <a:t>1/4/2017</a:t>
+              <a:t>1/5/2017</a:t>
             </a:fld>
             <a:endParaRPr lang="en-US" dirty="0"/>
           </a:p>
@@ -4438,7 +4698,7 @@
             <a:fld id="{89C235CF-BDA2-4E7E-8BBD-350479985E74}" type="datetimeFigureOut">
               <a:rPr lang="en-US" smtClean="0"/>
               <a:pPr/>
-              <a:t>1/4/2017</a:t>
+              <a:t>1/5/2017</a:t>
             </a:fld>
             <a:endParaRPr lang="en-US" dirty="0"/>
           </a:p>
@@ -4974,7 +5234,12 @@
             <p:ph type="ctrTitle"/>
           </p:nvPr>
         </p:nvSpPr>
-        <p:spPr/>
+        <p:spPr>
+          <a:xfrm>
+            <a:off x="1097280" y="2493818"/>
+            <a:ext cx="10058400" cy="1831294"/>
+          </a:xfrm>
+        </p:spPr>
         <p:txBody>
           <a:bodyPr>
             <a:normAutofit/>
@@ -5018,8 +5283,11 @@
           <a:p>
             <a:r>
               <a:rPr lang="da-DK" dirty="0"/>
-              <a:t>Bachelorprojekt 2017</a:t>
-            </a:r>
+              <a:t>Bachelorprojekt 16118</a:t>
+            </a:r>
+          </a:p>
+          <a:p>
+            <a:endParaRPr lang="da-DK" dirty="0"/>
           </a:p>
         </p:txBody>
       </p:sp>
@@ -5031,7 +5299,7 @@
           </p:cNvPicPr>
           <p:nvPr/>
         </p:nvPicPr>
-        <p:blipFill>
+        <p:blipFill rotWithShape="1">
           <a:blip r:embed="rId3">
             <a:extLst>
               <a:ext uri="{BEBA8EAE-BF5A-486C-A8C5-ECC9F3942E4B}">
@@ -5045,14 +5313,13 @@
               </a:ext>
             </a:extLst>
           </a:blip>
-          <a:stretch>
-            <a:fillRect/>
-          </a:stretch>
+          <a:srcRect t="18396"/>
+          <a:stretch/>
         </p:blipFill>
         <p:spPr>
           <a:xfrm>
-            <a:off x="6415423" y="-226746"/>
-            <a:ext cx="4234071" cy="4945702"/>
+            <a:off x="7237503" y="720850"/>
+            <a:ext cx="3918177" cy="3734771"/>
           </a:xfrm>
           <a:prstGeom prst="rect">
             <a:avLst/>
@@ -5132,9 +5399,13 @@
             </a:r>
           </a:p>
           <a:p>
+            <a:pPr>
+              <a:buFont typeface="Arial" panose="020B0604020202020204" pitchFamily="34" charset="0"/>
+              <a:buChar char="•"/>
+            </a:pPr>
             <a:r>
               <a:rPr lang="da-DK" dirty="0"/>
-              <a:t>- </a:t>
+              <a:t> </a:t>
             </a:r>
             <a:r>
               <a:rPr lang="da-DK" dirty="0" err="1"/>
@@ -5146,21 +5417,33 @@
             </a:r>
           </a:p>
           <a:p>
+            <a:pPr>
+              <a:buFont typeface="Arial" panose="020B0604020202020204" pitchFamily="34" charset="0"/>
+              <a:buChar char="•"/>
+            </a:pPr>
             <a:r>
               <a:rPr lang="da-DK" dirty="0"/>
-              <a:t>- Evaluering af sprint</a:t>
-            </a:r>
-          </a:p>
-          <a:p>
+              <a:t> Evaluering af sprint</a:t>
+            </a:r>
+          </a:p>
+          <a:p>
+            <a:pPr>
+              <a:buFont typeface="Arial" panose="020B0604020202020204" pitchFamily="34" charset="0"/>
+              <a:buChar char="•"/>
+            </a:pPr>
             <a:r>
               <a:rPr lang="da-DK" dirty="0"/>
-              <a:t>- Risikovurdering af projektet</a:t>
-            </a:r>
-          </a:p>
-          <a:p>
+              <a:t> Risikovurdering af projektet</a:t>
+            </a:r>
+          </a:p>
+          <a:p>
+            <a:pPr>
+              <a:buFont typeface="Arial" panose="020B0604020202020204" pitchFamily="34" charset="0"/>
+              <a:buChar char="•"/>
+            </a:pPr>
             <a:r>
               <a:rPr lang="da-DK" dirty="0"/>
-              <a:t>- </a:t>
+              <a:t> </a:t>
             </a:r>
             <a:r>
               <a:rPr lang="da-DK" dirty="0" err="1"/>
@@ -5272,18 +5555,26 @@
           <a:bodyPr/>
           <a:lstStyle/>
           <a:p>
-            <a:r>
-              <a:rPr lang="da-DK" b="1" dirty="0" err="1"/>
+            <a:pPr>
+              <a:buFont typeface="Arial" panose="020B0604020202020204" pitchFamily="34" charset="0"/>
+              <a:buChar char="•"/>
+            </a:pPr>
+            <a:r>
+              <a:rPr lang="da-DK" dirty="0" err="1"/>
               <a:t>Use</a:t>
             </a:r>
             <a:r>
-              <a:rPr lang="da-DK" b="1" dirty="0"/>
+              <a:rPr lang="da-DK" dirty="0"/>
               <a:t> cases </a:t>
             </a:r>
           </a:p>
           <a:p>
-            <a:r>
-              <a:rPr lang="da-DK" b="1" dirty="0"/>
+            <a:pPr>
+              <a:buFont typeface="Arial" panose="020B0604020202020204" pitchFamily="34" charset="0"/>
+              <a:buChar char="•"/>
+            </a:pPr>
+            <a:r>
+              <a:rPr lang="da-DK" dirty="0"/>
               <a:t>Brugerundersøgelser</a:t>
             </a:r>
           </a:p>
@@ -5487,12 +5778,14 @@
           <a:bodyPr/>
           <a:lstStyle/>
           <a:p>
+            <a:pPr>
+              <a:buFont typeface="Arial" panose="020B0604020202020204" pitchFamily="34" charset="0"/>
+              <a:buChar char="•"/>
+            </a:pPr>
             <a:r>
               <a:rPr lang="da-DK" dirty="0"/>
-              <a:t>Scrum har været godt </a:t>
-            </a:r>
-          </a:p>
-          <a:p>
+              <a:t> </a:t>
+            </a:r>
             <a:r>
               <a:rPr lang="da-DK" dirty="0" err="1"/>
               <a:t>Proof</a:t>
@@ -5505,10 +5798,30 @@
               <a:rPr lang="da-DK" dirty="0" err="1"/>
               <a:t>Concept</a:t>
             </a:r>
+            <a:endParaRPr lang="da-DK" dirty="0"/>
+          </a:p>
+          <a:p>
+            <a:pPr>
+              <a:buFont typeface="Arial" panose="020B0604020202020204" pitchFamily="34" charset="0"/>
+              <a:buChar char="•"/>
+            </a:pPr>
             <a:r>
               <a:rPr lang="da-DK" dirty="0"/>
-              <a:t>, videreudvikling påkrævet</a:t>
-            </a:r>
+              <a:t> Videreudvikling påkrævet</a:t>
+            </a:r>
+          </a:p>
+          <a:p>
+            <a:pPr>
+              <a:buFont typeface="Arial" panose="020B0604020202020204" pitchFamily="34" charset="0"/>
+              <a:buChar char="•"/>
+            </a:pPr>
+            <a:r>
+              <a:rPr lang="da-DK" dirty="0"/>
+              <a:t> Scrum </a:t>
+            </a:r>
+          </a:p>
+          <a:p>
+            <a:endParaRPr lang="da-DK" dirty="0"/>
           </a:p>
           <a:p>
             <a:endParaRPr lang="da-DK" dirty="0"/>
@@ -5660,7 +5973,9 @@
         </p:nvSpPr>
         <p:spPr/>
         <p:txBody>
-          <a:bodyPr/>
+          <a:bodyPr>
+            <a:normAutofit/>
+          </a:bodyPr>
           <a:lstStyle/>
           <a:p>
             <a:pPr>
@@ -6094,27 +6409,43 @@
             </a:r>
           </a:p>
           <a:p>
+            <a:pPr>
+              <a:buFont typeface="Arial" panose="020B0604020202020204" pitchFamily="34" charset="0"/>
+              <a:buChar char="•"/>
+            </a:pPr>
             <a:r>
               <a:rPr lang="da-DK" dirty="0"/>
-              <a:t>- Detektering af brystområde, men ikke fuld scanning </a:t>
-            </a:r>
-          </a:p>
-          <a:p>
+              <a:t> Detektering af brystområde, men ikke fuld scanning </a:t>
+            </a:r>
+          </a:p>
+          <a:p>
+            <a:pPr>
+              <a:buFont typeface="Arial" panose="020B0604020202020204" pitchFamily="34" charset="0"/>
+              <a:buChar char="•"/>
+            </a:pPr>
             <a:r>
               <a:rPr lang="da-DK" dirty="0"/>
-              <a:t>- Omkostninger forbundet med screeningsprogrammet </a:t>
-            </a:r>
-          </a:p>
-          <a:p>
+              <a:t> Omkostninger forbundet med screeningsprogrammet </a:t>
+            </a:r>
+          </a:p>
+          <a:p>
+            <a:pPr>
+              <a:buFont typeface="Arial" panose="020B0604020202020204" pitchFamily="34" charset="0"/>
+              <a:buChar char="•"/>
+            </a:pPr>
             <a:r>
               <a:rPr lang="da-DK" dirty="0"/>
-              <a:t>- Flere kræftformer findes, højere overlevelsesproces men også overdiagnosticering </a:t>
-            </a:r>
-          </a:p>
-          <a:p>
+              <a:t> Flere kræftformer findes, højere overlevelsesproces men også overdiagnosticering </a:t>
+            </a:r>
+          </a:p>
+          <a:p>
+            <a:pPr>
+              <a:buFont typeface="Arial" panose="020B0604020202020204" pitchFamily="34" charset="0"/>
+              <a:buChar char="•"/>
+            </a:pPr>
             <a:r>
               <a:rPr lang="da-DK" dirty="0"/>
-              <a:t>- MDD skal overholdes</a:t>
+              <a:t> MDD skal overholdes</a:t>
             </a:r>
           </a:p>
         </p:txBody>
@@ -6272,9 +6603,13 @@
             </a:r>
           </a:p>
           <a:p>
+            <a:pPr>
+              <a:buFont typeface="Arial" panose="020B0604020202020204" pitchFamily="34" charset="0"/>
+              <a:buChar char="•"/>
+            </a:pPr>
             <a:r>
               <a:rPr lang="da-DK" dirty="0"/>
-              <a:t>- </a:t>
+              <a:t> </a:t>
             </a:r>
             <a:r>
               <a:rPr lang="da-DK" dirty="0" err="1"/>
@@ -6286,15 +6621,23 @@
             </a:r>
           </a:p>
           <a:p>
+            <a:pPr>
+              <a:buFont typeface="Arial" panose="020B0604020202020204" pitchFamily="34" charset="0"/>
+              <a:buChar char="•"/>
+            </a:pPr>
             <a:r>
               <a:rPr lang="da-DK" dirty="0"/>
-              <a:t>- Transport som variabel </a:t>
-            </a:r>
-          </a:p>
-          <a:p>
+              <a:t> Transport som variabel </a:t>
+            </a:r>
+          </a:p>
+          <a:p>
+            <a:pPr>
+              <a:buFont typeface="Arial" panose="020B0604020202020204" pitchFamily="34" charset="0"/>
+              <a:buChar char="•"/>
+            </a:pPr>
             <a:r>
               <a:rPr lang="da-DK" dirty="0"/>
-              <a:t>- Omkostninger til udstyr </a:t>
+              <a:t> Omkostninger til udstyr </a:t>
             </a:r>
           </a:p>
           <a:p>
@@ -6314,7 +6657,7 @@
           <p:nvPr/>
         </p:nvPicPr>
         <p:blipFill>
-          <a:blip r:embed="rId2"/>
+          <a:blip r:embed="rId3"/>
           <a:stretch>
             <a:fillRect/>
           </a:stretch>
@@ -6402,33 +6745,53 @@
             </a:r>
           </a:p>
           <a:p>
+            <a:pPr>
+              <a:buFont typeface="Arial" panose="020B0604020202020204" pitchFamily="34" charset="0"/>
+              <a:buChar char="•"/>
+            </a:pPr>
             <a:r>
               <a:rPr lang="da-DK" dirty="0"/>
-              <a:t>- Nationale og internationale studier</a:t>
-            </a:r>
-          </a:p>
-          <a:p>
+              <a:t> Nationale og internationale studier</a:t>
+            </a:r>
+          </a:p>
+          <a:p>
+            <a:pPr>
+              <a:buFont typeface="Arial" panose="020B0604020202020204" pitchFamily="34" charset="0"/>
+              <a:buChar char="•"/>
+            </a:pPr>
             <a:r>
               <a:rPr lang="da-DK" dirty="0"/>
-              <a:t>- Kombination af ultralyd og røntgen opdager tidligere stadier af kræft </a:t>
-            </a:r>
-          </a:p>
-          <a:p>
+              <a:t> Kombination af ultralyd og røntgen opdager tidligere stadier af kræft </a:t>
+            </a:r>
+          </a:p>
+          <a:p>
+            <a:pPr>
+              <a:buFont typeface="Arial" panose="020B0604020202020204" pitchFamily="34" charset="0"/>
+              <a:buChar char="•"/>
+            </a:pPr>
             <a:r>
               <a:rPr lang="da-DK" dirty="0"/>
-              <a:t>- Billigere behandling og højere overlevelsesprocent ved tidligere stadier </a:t>
-            </a:r>
-          </a:p>
-          <a:p>
+              <a:t> Billigere behandling og højere overlevelsesprocent ved tidligere stadier </a:t>
+            </a:r>
+          </a:p>
+          <a:p>
+            <a:pPr>
+              <a:buFont typeface="Arial" panose="020B0604020202020204" pitchFamily="34" charset="0"/>
+              <a:buChar char="•"/>
+            </a:pPr>
             <a:r>
               <a:rPr lang="da-DK" dirty="0"/>
-              <a:t>- Overdiagnosticering og unødvendig behandling </a:t>
-            </a:r>
-          </a:p>
-          <a:p>
+              <a:t> Overdiagnosticering og unødvendig behandling </a:t>
+            </a:r>
+          </a:p>
+          <a:p>
+            <a:pPr>
+              <a:buFont typeface="Arial" panose="020B0604020202020204" pitchFamily="34" charset="0"/>
+              <a:buChar char="•"/>
+            </a:pPr>
             <a:r>
               <a:rPr lang="da-DK" dirty="0"/>
-              <a:t>- Omkostningseffektivitet, QALY </a:t>
+              <a:t> Omkostningseffektivitet, QALY </a:t>
             </a:r>
           </a:p>
           <a:p>

</xml_diff>

<commit_message>
stikord til medicinsk godkendelse
</commit_message>
<xml_diff>
--- a/Præsentation_Eksamen.pptx
+++ b/Præsentation_Eksamen.pptx
@@ -6520,6 +6520,66 @@
             <a:r>
               <a:rPr lang="da-DK" b="1" dirty="0"/>
               <a:t>Medicinsk godkendelse</a:t>
+            </a:r>
+          </a:p>
+          <a:p>
+            <a:r>
+              <a:rPr lang="da-DK" b="1" dirty="0"/>
+              <a:t>- Vejen til CE-mærkning</a:t>
+            </a:r>
+          </a:p>
+          <a:p>
+            <a:pPr lvl="1"/>
+            <a:r>
+              <a:rPr lang="da-DK" b="1" dirty="0"/>
+              <a:t>Klassificering</a:t>
+            </a:r>
+          </a:p>
+          <a:p>
+            <a:pPr lvl="1"/>
+            <a:r>
+              <a:rPr lang="da-DK" b="1" dirty="0"/>
+              <a:t>Overholde krav om sikkerhed og ydeevne</a:t>
+            </a:r>
+          </a:p>
+          <a:p>
+            <a:pPr lvl="1"/>
+            <a:r>
+              <a:rPr lang="da-DK" b="1" dirty="0"/>
+              <a:t>Dokumentation til hvordan kravene er overholdt</a:t>
+            </a:r>
+          </a:p>
+          <a:p>
+            <a:pPr lvl="1"/>
+            <a:r>
+              <a:rPr lang="da-DK" b="1" dirty="0"/>
+              <a:t>Valg af bemyndiget organ </a:t>
+            </a:r>
+          </a:p>
+          <a:p>
+            <a:pPr lvl="1"/>
+            <a:r>
+              <a:rPr lang="da-DK" b="1" dirty="0"/>
+              <a:t>Markedsovervågningssystem</a:t>
+            </a:r>
+          </a:p>
+          <a:p>
+            <a:pPr lvl="1"/>
+            <a:r>
+              <a:rPr lang="da-DK" b="1" dirty="0"/>
+              <a:t>Underskrivelse af </a:t>
+            </a:r>
+            <a:r>
+              <a:rPr lang="da-DK" b="1" dirty="0" err="1"/>
+              <a:t>overenstemmelseserklæring</a:t>
+            </a:r>
+            <a:endParaRPr lang="da-DK" b="1" dirty="0"/>
+          </a:p>
+          <a:p>
+            <a:pPr lvl="1"/>
+            <a:r>
+              <a:rPr lang="da-DK" b="1" dirty="0"/>
+              <a:t>Registrering hos lægemiddelstyrelsen. </a:t>
             </a:r>
           </a:p>
           <a:p>

</xml_diff>

<commit_message>
Præsentation - rettelser og pdf
</commit_message>
<xml_diff>
--- a/Præsentation_Eksamen.pptx
+++ b/Præsentation_Eksamen.pptx
@@ -232,7 +232,7 @@
           <a:p>
             <a:fld id="{6AF9F838-B633-4D47-BC11-C4B614E0B93C}" type="datetimeFigureOut">
               <a:rPr lang="da-DK" smtClean="0"/>
-              <a:t>05-01-2017</a:t>
+              <a:t>06-01-2017</a:t>
             </a:fld>
             <a:endParaRPr lang="da-DK"/>
           </a:p>
@@ -543,7 +543,10 @@
           <a:bodyPr/>
           <a:lstStyle/>
           <a:p>
-            <a:endParaRPr lang="da-DK" dirty="0"/>
+            <a:r>
+              <a:rPr lang="da-DK" dirty="0"/>
+              <a:t>Charlotte</a:t>
+            </a:r>
           </a:p>
         </p:txBody>
       </p:sp>
@@ -627,7 +630,10 @@
           <a:bodyPr/>
           <a:lstStyle/>
           <a:p>
-            <a:endParaRPr lang="da-DK" dirty="0"/>
+            <a:r>
+              <a:rPr lang="da-DK" dirty="0"/>
+              <a:t>MSN</a:t>
+            </a:r>
           </a:p>
         </p:txBody>
       </p:sp>
@@ -648,7 +654,7 @@
           <a:p>
             <a:fld id="{81DAF125-77CF-4549-A25B-16435FA351B7}" type="slidenum">
               <a:rPr lang="da-DK" smtClean="0"/>
-              <a:t>12</a:t>
+              <a:t>10</a:t>
             </a:fld>
             <a:endParaRPr lang="da-DK"/>
           </a:p>
@@ -657,7 +663,7 @@
     </p:spTree>
     <p:extLst>
       <p:ext uri="{BB962C8B-B14F-4D97-AF65-F5344CB8AC3E}">
-        <p14:creationId xmlns:p14="http://schemas.microsoft.com/office/powerpoint/2010/main" val="1635502081"/>
+        <p14:creationId xmlns:p14="http://schemas.microsoft.com/office/powerpoint/2010/main" val="3284237135"/>
       </p:ext>
     </p:extLst>
   </p:cSld>
@@ -710,6 +716,330 @@
         <p:txBody>
           <a:bodyPr/>
           <a:lstStyle/>
+          <a:p>
+            <a:r>
+              <a:rPr lang="da-DK" dirty="0"/>
+              <a:t>MSN</a:t>
+            </a:r>
+          </a:p>
+          <a:p>
+            <a:endParaRPr lang="da-DK" dirty="0"/>
+          </a:p>
+          <a:p>
+            <a:r>
+              <a:rPr lang="da-DK" dirty="0"/>
+              <a:t>Brugerundersøgelser til at finde ud af,</a:t>
+            </a:r>
+            <a:r>
+              <a:rPr lang="da-DK" baseline="0" dirty="0"/>
+              <a:t> hvad vi skal have med som krav</a:t>
+            </a:r>
+          </a:p>
+          <a:p>
+            <a:endParaRPr lang="da-DK" baseline="0" dirty="0"/>
+          </a:p>
+          <a:p>
+            <a:r>
+              <a:rPr lang="da-DK" baseline="0" dirty="0"/>
+              <a:t>UC – 4 styks </a:t>
+            </a:r>
+            <a:endParaRPr lang="da-DK" dirty="0"/>
+          </a:p>
+        </p:txBody>
+      </p:sp>
+      <p:sp>
+        <p:nvSpPr>
+          <p:cNvPr id="4" name="Pladsholder til slidenummer 3"/>
+          <p:cNvSpPr>
+            <a:spLocks noGrp="1"/>
+          </p:cNvSpPr>
+          <p:nvPr>
+            <p:ph type="sldNum" sz="quarter" idx="10"/>
+          </p:nvPr>
+        </p:nvSpPr>
+        <p:spPr/>
+        <p:txBody>
+          <a:bodyPr/>
+          <a:lstStyle/>
+          <a:p>
+            <a:fld id="{81DAF125-77CF-4549-A25B-16435FA351B7}" type="slidenum">
+              <a:rPr lang="da-DK" smtClean="0"/>
+              <a:t>11</a:t>
+            </a:fld>
+            <a:endParaRPr lang="da-DK"/>
+          </a:p>
+        </p:txBody>
+      </p:sp>
+    </p:spTree>
+    <p:extLst>
+      <p:ext uri="{BB962C8B-B14F-4D97-AF65-F5344CB8AC3E}">
+        <p14:creationId xmlns:p14="http://schemas.microsoft.com/office/powerpoint/2010/main" val="4183857365"/>
+      </p:ext>
+    </p:extLst>
+  </p:cSld>
+  <p:clrMapOvr>
+    <a:masterClrMapping/>
+  </p:clrMapOvr>
+</p:notes>
+</file>
+
+<file path=ppt/notesSlides/notesSlide12.xml><?xml version="1.0" encoding="utf-8"?>
+<p:notes xmlns:a="http://schemas.openxmlformats.org/drawingml/2006/main" xmlns:r="http://schemas.openxmlformats.org/officeDocument/2006/relationships" xmlns:p="http://schemas.openxmlformats.org/presentationml/2006/main">
+  <p:cSld>
+    <p:spTree>
+      <p:nvGrpSpPr>
+        <p:cNvPr id="1" name=""/>
+        <p:cNvGrpSpPr/>
+        <p:nvPr/>
+      </p:nvGrpSpPr>
+      <p:grpSpPr>
+        <a:xfrm>
+          <a:off x="0" y="0"/>
+          <a:ext cx="0" cy="0"/>
+          <a:chOff x="0" y="0"/>
+          <a:chExt cx="0" cy="0"/>
+        </a:xfrm>
+      </p:grpSpPr>
+      <p:sp>
+        <p:nvSpPr>
+          <p:cNvPr id="2" name="Pladsholder til slidebillede 1"/>
+          <p:cNvSpPr>
+            <a:spLocks noGrp="1" noRot="1" noChangeAspect="1"/>
+          </p:cNvSpPr>
+          <p:nvPr>
+            <p:ph type="sldImg"/>
+          </p:nvPr>
+        </p:nvSpPr>
+        <p:spPr/>
+      </p:sp>
+      <p:sp>
+        <p:nvSpPr>
+          <p:cNvPr id="3" name="Pladsholder til noter 2"/>
+          <p:cNvSpPr>
+            <a:spLocks noGrp="1"/>
+          </p:cNvSpPr>
+          <p:nvPr>
+            <p:ph type="body" idx="1"/>
+          </p:nvPr>
+        </p:nvSpPr>
+        <p:spPr/>
+        <p:txBody>
+          <a:bodyPr/>
+          <a:lstStyle/>
+          <a:p>
+            <a:r>
+              <a:rPr lang="da-DK" dirty="0"/>
+              <a:t>MSN</a:t>
+            </a:r>
+          </a:p>
+          <a:p>
+            <a:endParaRPr lang="da-DK" dirty="0"/>
+          </a:p>
+          <a:p>
+            <a:r>
+              <a:rPr lang="da-DK" dirty="0"/>
+              <a:t>Vi</a:t>
+            </a:r>
+            <a:r>
+              <a:rPr lang="da-DK" baseline="0" dirty="0"/>
+              <a:t> har arbejdet ud fra, at det skal kunne videreudvikles på. </a:t>
+            </a:r>
+            <a:endParaRPr lang="da-DK" dirty="0"/>
+          </a:p>
+        </p:txBody>
+      </p:sp>
+      <p:sp>
+        <p:nvSpPr>
+          <p:cNvPr id="4" name="Pladsholder til slidenummer 3"/>
+          <p:cNvSpPr>
+            <a:spLocks noGrp="1"/>
+          </p:cNvSpPr>
+          <p:nvPr>
+            <p:ph type="sldNum" sz="quarter" idx="10"/>
+          </p:nvPr>
+        </p:nvSpPr>
+        <p:spPr/>
+        <p:txBody>
+          <a:bodyPr/>
+          <a:lstStyle/>
+          <a:p>
+            <a:fld id="{81DAF125-77CF-4549-A25B-16435FA351B7}" type="slidenum">
+              <a:rPr lang="da-DK" smtClean="0"/>
+              <a:t>12</a:t>
+            </a:fld>
+            <a:endParaRPr lang="da-DK"/>
+          </a:p>
+        </p:txBody>
+      </p:sp>
+    </p:spTree>
+    <p:extLst>
+      <p:ext uri="{BB962C8B-B14F-4D97-AF65-F5344CB8AC3E}">
+        <p14:creationId xmlns:p14="http://schemas.microsoft.com/office/powerpoint/2010/main" val="1635502081"/>
+      </p:ext>
+    </p:extLst>
+  </p:cSld>
+  <p:clrMapOvr>
+    <a:masterClrMapping/>
+  </p:clrMapOvr>
+</p:notes>
+</file>
+
+<file path=ppt/notesSlides/notesSlide13.xml><?xml version="1.0" encoding="utf-8"?>
+<p:notes xmlns:a="http://schemas.openxmlformats.org/drawingml/2006/main" xmlns:r="http://schemas.openxmlformats.org/officeDocument/2006/relationships" xmlns:p="http://schemas.openxmlformats.org/presentationml/2006/main">
+  <p:cSld>
+    <p:spTree>
+      <p:nvGrpSpPr>
+        <p:cNvPr id="1" name=""/>
+        <p:cNvGrpSpPr/>
+        <p:nvPr/>
+      </p:nvGrpSpPr>
+      <p:grpSpPr>
+        <a:xfrm>
+          <a:off x="0" y="0"/>
+          <a:ext cx="0" cy="0"/>
+          <a:chOff x="0" y="0"/>
+          <a:chExt cx="0" cy="0"/>
+        </a:xfrm>
+      </p:grpSpPr>
+      <p:sp>
+        <p:nvSpPr>
+          <p:cNvPr id="2" name="Pladsholder til slidebillede 1"/>
+          <p:cNvSpPr>
+            <a:spLocks noGrp="1" noRot="1" noChangeAspect="1"/>
+          </p:cNvSpPr>
+          <p:nvPr>
+            <p:ph type="sldImg"/>
+          </p:nvPr>
+        </p:nvSpPr>
+        <p:spPr/>
+      </p:sp>
+      <p:sp>
+        <p:nvSpPr>
+          <p:cNvPr id="3" name="Pladsholder til noter 2"/>
+          <p:cNvSpPr>
+            <a:spLocks noGrp="1"/>
+          </p:cNvSpPr>
+          <p:nvPr>
+            <p:ph type="body" idx="1"/>
+          </p:nvPr>
+        </p:nvSpPr>
+        <p:spPr/>
+        <p:txBody>
+          <a:bodyPr/>
+          <a:lstStyle/>
+          <a:p>
+            <a:r>
+              <a:rPr lang="da-DK" dirty="0"/>
+              <a:t>MSN</a:t>
+            </a:r>
+          </a:p>
+          <a:p>
+            <a:r>
+              <a:rPr lang="da-DK" dirty="0"/>
+              <a:t>Det</a:t>
+            </a:r>
+            <a:r>
+              <a:rPr lang="da-DK" baseline="0" dirty="0"/>
+              <a:t> kan ikke bruges i hospitalsvæsenet </a:t>
+            </a:r>
+          </a:p>
+          <a:p>
+            <a:endParaRPr lang="da-DK" baseline="0" dirty="0"/>
+          </a:p>
+          <a:p>
+            <a:r>
+              <a:rPr lang="da-DK" baseline="0" dirty="0"/>
+              <a:t>Tværfaglig</a:t>
+            </a:r>
+            <a:endParaRPr lang="da-DK" dirty="0"/>
+          </a:p>
+        </p:txBody>
+      </p:sp>
+      <p:sp>
+        <p:nvSpPr>
+          <p:cNvPr id="4" name="Pladsholder til slidenummer 3"/>
+          <p:cNvSpPr>
+            <a:spLocks noGrp="1"/>
+          </p:cNvSpPr>
+          <p:nvPr>
+            <p:ph type="sldNum" sz="quarter" idx="10"/>
+          </p:nvPr>
+        </p:nvSpPr>
+        <p:spPr/>
+        <p:txBody>
+          <a:bodyPr/>
+          <a:lstStyle/>
+          <a:p>
+            <a:fld id="{81DAF125-77CF-4549-A25B-16435FA351B7}" type="slidenum">
+              <a:rPr lang="da-DK" smtClean="0"/>
+              <a:t>13</a:t>
+            </a:fld>
+            <a:endParaRPr lang="da-DK"/>
+          </a:p>
+        </p:txBody>
+      </p:sp>
+    </p:spTree>
+    <p:extLst>
+      <p:ext uri="{BB962C8B-B14F-4D97-AF65-F5344CB8AC3E}">
+        <p14:creationId xmlns:p14="http://schemas.microsoft.com/office/powerpoint/2010/main" val="1808237219"/>
+      </p:ext>
+    </p:extLst>
+  </p:cSld>
+  <p:clrMapOvr>
+    <a:masterClrMapping/>
+  </p:clrMapOvr>
+</p:notes>
+</file>
+
+<file path=ppt/notesSlides/notesSlide14.xml><?xml version="1.0" encoding="utf-8"?>
+<p:notes xmlns:a="http://schemas.openxmlformats.org/drawingml/2006/main" xmlns:r="http://schemas.openxmlformats.org/officeDocument/2006/relationships" xmlns:p="http://schemas.openxmlformats.org/presentationml/2006/main">
+  <p:cSld>
+    <p:spTree>
+      <p:nvGrpSpPr>
+        <p:cNvPr id="1" name=""/>
+        <p:cNvGrpSpPr/>
+        <p:nvPr/>
+      </p:nvGrpSpPr>
+      <p:grpSpPr>
+        <a:xfrm>
+          <a:off x="0" y="0"/>
+          <a:ext cx="0" cy="0"/>
+          <a:chOff x="0" y="0"/>
+          <a:chExt cx="0" cy="0"/>
+        </a:xfrm>
+      </p:grpSpPr>
+      <p:sp>
+        <p:nvSpPr>
+          <p:cNvPr id="2" name="Pladsholder til slidebillede 1"/>
+          <p:cNvSpPr>
+            <a:spLocks noGrp="1" noRot="1" noChangeAspect="1"/>
+          </p:cNvSpPr>
+          <p:nvPr>
+            <p:ph type="sldImg"/>
+          </p:nvPr>
+        </p:nvSpPr>
+        <p:spPr/>
+      </p:sp>
+      <p:sp>
+        <p:nvSpPr>
+          <p:cNvPr id="3" name="Pladsholder til noter 2"/>
+          <p:cNvSpPr>
+            <a:spLocks noGrp="1"/>
+          </p:cNvSpPr>
+          <p:nvPr>
+            <p:ph type="body" idx="1"/>
+          </p:nvPr>
+        </p:nvSpPr>
+        <p:spPr/>
+        <p:txBody>
+          <a:bodyPr/>
+          <a:lstStyle/>
+          <a:p>
+            <a:endParaRPr lang="da-DK" dirty="0"/>
+          </a:p>
+          <a:p>
+            <a:endParaRPr lang="da-DK" dirty="0"/>
+          </a:p>
           <a:p>
             <a:r>
               <a:rPr lang="da-DK" dirty="0"/>
@@ -798,7 +1128,10 @@
           <a:bodyPr/>
           <a:lstStyle/>
           <a:p>
-            <a:endParaRPr lang="da-DK" dirty="0"/>
+            <a:r>
+              <a:rPr lang="da-DK" dirty="0"/>
+              <a:t>Charlotte</a:t>
+            </a:r>
           </a:p>
         </p:txBody>
       </p:sp>
@@ -882,7 +1215,10 @@
           <a:bodyPr/>
           <a:lstStyle/>
           <a:p>
-            <a:endParaRPr lang="da-DK" dirty="0"/>
+            <a:r>
+              <a:rPr lang="da-DK" dirty="0"/>
+              <a:t>Marie</a:t>
+            </a:r>
           </a:p>
         </p:txBody>
       </p:sp>
@@ -967,6 +1303,12 @@
           <a:lstStyle/>
           <a:p>
             <a:r>
+              <a:rPr lang="da-DK" dirty="0"/>
+              <a:t>Marie</a:t>
+            </a:r>
+          </a:p>
+          <a:p>
+            <a:r>
               <a:rPr lang="da-DK" dirty="0" err="1"/>
               <a:t>Proof</a:t>
             </a:r>
@@ -1070,6 +1412,56 @@
           <a:bodyPr/>
           <a:lstStyle/>
           <a:p>
+            <a:pPr>
+              <a:buFont typeface="Arial" panose="020B0604020202020204" pitchFamily="34" charset="0"/>
+              <a:buNone/>
+            </a:pPr>
+            <a:r>
+              <a:rPr lang="da-DK" dirty="0"/>
+              <a:t>Marie </a:t>
+            </a:r>
+          </a:p>
+          <a:p>
+            <a:pPr>
+              <a:buFont typeface="Arial" panose="020B0604020202020204" pitchFamily="34" charset="0"/>
+              <a:buChar char="•"/>
+            </a:pPr>
+            <a:r>
+              <a:rPr lang="da-DK" dirty="0"/>
+              <a:t>Detektering af brystområde, men ikke fuld scanning </a:t>
+            </a:r>
+          </a:p>
+          <a:p>
+            <a:pPr>
+              <a:buFont typeface="Arial" panose="020B0604020202020204" pitchFamily="34" charset="0"/>
+              <a:buChar char="•"/>
+            </a:pPr>
+            <a:r>
+              <a:rPr lang="da-DK" dirty="0"/>
+              <a:t> Omkostninger forbundet med screeningsprogrammet </a:t>
+            </a:r>
+          </a:p>
+          <a:p>
+            <a:pPr>
+              <a:buFont typeface="Arial" panose="020B0604020202020204" pitchFamily="34" charset="0"/>
+              <a:buChar char="•"/>
+            </a:pPr>
+            <a:r>
+              <a:rPr lang="da-DK" dirty="0"/>
+              <a:t> Flere kræftformer findes, højere overlevelsesproces men også overdiagnosticering </a:t>
+            </a:r>
+          </a:p>
+          <a:p>
+            <a:pPr>
+              <a:buFont typeface="Arial" panose="020B0604020202020204" pitchFamily="34" charset="0"/>
+              <a:buChar char="•"/>
+            </a:pPr>
+            <a:r>
+              <a:rPr lang="da-DK" dirty="0"/>
+              <a:t> MDD skal overholdes</a:t>
+            </a:r>
+          </a:p>
+          <a:p>
             <a:endParaRPr lang="da-DK" dirty="0"/>
           </a:p>
         </p:txBody>
@@ -1154,7 +1546,76 @@
           <a:bodyPr/>
           <a:lstStyle/>
           <a:p>
-            <a:endParaRPr lang="da-DK"/>
+            <a:r>
+              <a:rPr lang="da-DK" dirty="0"/>
+              <a:t>Marie</a:t>
+            </a:r>
+          </a:p>
+          <a:p>
+            <a:endParaRPr lang="da-DK" dirty="0"/>
+          </a:p>
+          <a:p>
+            <a:r>
+              <a:rPr lang="da-DK" dirty="0"/>
+              <a:t>- Vejen til CE-mærkning</a:t>
+            </a:r>
+          </a:p>
+          <a:p>
+            <a:pPr lvl="1"/>
+            <a:r>
+              <a:rPr lang="da-DK" dirty="0"/>
+              <a:t>Klassificering</a:t>
+            </a:r>
+          </a:p>
+          <a:p>
+            <a:pPr lvl="1"/>
+            <a:r>
+              <a:rPr lang="da-DK" dirty="0"/>
+              <a:t>Overholde krav om sikkerhed og ydeevne</a:t>
+            </a:r>
+          </a:p>
+          <a:p>
+            <a:pPr lvl="1"/>
+            <a:r>
+              <a:rPr lang="da-DK" dirty="0"/>
+              <a:t>Dokumentation til hvordan kravene er overholdt</a:t>
+            </a:r>
+          </a:p>
+          <a:p>
+            <a:pPr lvl="1"/>
+            <a:r>
+              <a:rPr lang="da-DK" dirty="0"/>
+              <a:t>Valg af bemyndiget organ </a:t>
+            </a:r>
+          </a:p>
+          <a:p>
+            <a:pPr lvl="1"/>
+            <a:r>
+              <a:rPr lang="da-DK" dirty="0"/>
+              <a:t>Markedsovervågningssystem</a:t>
+            </a:r>
+          </a:p>
+          <a:p>
+            <a:pPr lvl="1"/>
+            <a:r>
+              <a:rPr lang="da-DK" dirty="0"/>
+              <a:t>Underskrivelse af </a:t>
+            </a:r>
+            <a:r>
+              <a:rPr lang="da-DK" dirty="0" err="1"/>
+              <a:t>overenstemmelseserklæring</a:t>
+            </a:r>
+            <a:endParaRPr lang="da-DK" dirty="0"/>
+          </a:p>
+          <a:p>
+            <a:pPr lvl="1"/>
+            <a:r>
+              <a:rPr lang="da-DK" dirty="0"/>
+              <a:t>Registrering hos lægemiddelstyrelsen. </a:t>
+            </a:r>
+          </a:p>
+          <a:p>
+            <a:endParaRPr lang="da-DK" dirty="0"/>
           </a:p>
         </p:txBody>
       </p:sp>
@@ -1175,7 +1636,7 @@
           <a:p>
             <a:fld id="{81DAF125-77CF-4549-A25B-16435FA351B7}" type="slidenum">
               <a:rPr lang="da-DK" smtClean="0"/>
-              <a:t>7</a:t>
+              <a:t>6</a:t>
             </a:fld>
             <a:endParaRPr lang="da-DK"/>
           </a:p>
@@ -1184,7 +1645,7 @@
     </p:spTree>
     <p:extLst>
       <p:ext uri="{BB962C8B-B14F-4D97-AF65-F5344CB8AC3E}">
-        <p14:creationId xmlns:p14="http://schemas.microsoft.com/office/powerpoint/2010/main" val="4196849113"/>
+        <p14:creationId xmlns:p14="http://schemas.microsoft.com/office/powerpoint/2010/main" val="1007746447"/>
       </p:ext>
     </p:extLst>
   </p:cSld>
@@ -1240,49 +1701,7 @@
           <a:p>
             <a:r>
               <a:rPr lang="da-DK" dirty="0"/>
-              <a:t>Størstedelen af litteraturen konkluderer, at mere forskning er nødvendig på området. Det</a:t>
-            </a:r>
-          </a:p>
-          <a:p>
-            <a:r>
-              <a:rPr lang="da-DK" dirty="0"/>
-              <a:t>kan derfor være svært at lave en endelig konklusion på, hvorvidt en udvidelse af screeningsprogrammet</a:t>
-            </a:r>
-          </a:p>
-          <a:p>
-            <a:r>
-              <a:rPr lang="da-DK" dirty="0"/>
-              <a:t>vil være en god idé. Fordelen er, at man ved en kombination af ultralyd og</a:t>
-            </a:r>
-          </a:p>
-          <a:p>
-            <a:r>
-              <a:rPr lang="da-DK" dirty="0"/>
-              <a:t>røntgen kan opdage tidligere stadier af kræft, hvilket er billigere, og overlevelsesprocenten</a:t>
-            </a:r>
-          </a:p>
-          <a:p>
-            <a:r>
-              <a:rPr lang="da-DK" dirty="0"/>
-              <a:t>er højere. Ulemperne er, at der sker overdiagnosticering ved screeninger, og patienter derfor</a:t>
-            </a:r>
-          </a:p>
-          <a:p>
-            <a:r>
-              <a:rPr lang="da-DK" dirty="0"/>
-              <a:t>behandles uden grund. Tilføjelse af ultralydsscanninger til screeningsprogrammet vil øge</a:t>
-            </a:r>
-          </a:p>
-          <a:p>
-            <a:r>
-              <a:rPr lang="da-DK" dirty="0"/>
-              <a:t>omkostningerne og dermed prisen pr. QALY, hvilket sandsynligvis vil betyde, at udvidelse</a:t>
-            </a:r>
-          </a:p>
-          <a:p>
-            <a:r>
-              <a:rPr lang="da-DK" dirty="0"/>
-              <a:t>af screeningsprogrammet ikke er omkostningseffektivt.</a:t>
+              <a:t>Charlotte</a:t>
             </a:r>
           </a:p>
         </p:txBody>
@@ -1304,7 +1723,7 @@
           <a:p>
             <a:fld id="{81DAF125-77CF-4549-A25B-16435FA351B7}" type="slidenum">
               <a:rPr lang="da-DK" smtClean="0"/>
-              <a:t>8</a:t>
+              <a:t>7</a:t>
             </a:fld>
             <a:endParaRPr lang="da-DK"/>
           </a:p>
@@ -1313,7 +1732,7 @@
     </p:spTree>
     <p:extLst>
       <p:ext uri="{BB962C8B-B14F-4D97-AF65-F5344CB8AC3E}">
-        <p14:creationId xmlns:p14="http://schemas.microsoft.com/office/powerpoint/2010/main" val="1022816383"/>
+        <p14:creationId xmlns:p14="http://schemas.microsoft.com/office/powerpoint/2010/main" val="4196849113"/>
       </p:ext>
     </p:extLst>
   </p:cSld>
@@ -1369,29 +1788,8 @@
           <a:p>
             <a:r>
               <a:rPr lang="da-DK" dirty="0"/>
-              <a:t>Interesseområder, fremtid, gav mening efter kompetencer </a:t>
-            </a:r>
-            <a:r>
-              <a:rPr lang="da-DK" dirty="0" err="1"/>
-              <a:t>bla</a:t>
-            </a:r>
-            <a:r>
-              <a:rPr lang="da-DK" baseline="0" dirty="0"/>
-              <a:t> </a:t>
-            </a:r>
-            <a:r>
-              <a:rPr lang="da-DK" baseline="0" dirty="0" err="1"/>
-              <a:t>bla</a:t>
-            </a:r>
-            <a:r>
-              <a:rPr lang="da-DK" baseline="0" dirty="0"/>
-              <a:t> </a:t>
-            </a:r>
-            <a:r>
-              <a:rPr lang="da-DK" baseline="0" dirty="0" err="1"/>
-              <a:t>bla</a:t>
-            </a:r>
-            <a:endParaRPr lang="da-DK" dirty="0"/>
+              <a:t>Charlotte</a:t>
+            </a:r>
           </a:p>
         </p:txBody>
       </p:sp>
@@ -1412,7 +1810,7 @@
           <a:p>
             <a:fld id="{81DAF125-77CF-4549-A25B-16435FA351B7}" type="slidenum">
               <a:rPr lang="da-DK" smtClean="0"/>
-              <a:t>9</a:t>
+              <a:t>8</a:t>
             </a:fld>
             <a:endParaRPr lang="da-DK"/>
           </a:p>
@@ -1421,7 +1819,7 @@
     </p:spTree>
     <p:extLst>
       <p:ext uri="{BB962C8B-B14F-4D97-AF65-F5344CB8AC3E}">
-        <p14:creationId xmlns:p14="http://schemas.microsoft.com/office/powerpoint/2010/main" val="746107577"/>
+        <p14:creationId xmlns:p14="http://schemas.microsoft.com/office/powerpoint/2010/main" val="1022816383"/>
       </p:ext>
     </p:extLst>
   </p:cSld>
@@ -1477,20 +1875,33 @@
           <a:p>
             <a:r>
               <a:rPr lang="da-DK" dirty="0"/>
-              <a:t>Brugerundersøgelser til at finde ud af,</a:t>
+              <a:t>Charlotte</a:t>
+            </a:r>
+          </a:p>
+          <a:p>
+            <a:r>
+              <a:rPr lang="da-DK" dirty="0"/>
+              <a:t>Interesseområder, fremtid, gav mening efter kompetencer </a:t>
+            </a:r>
+            <a:r>
+              <a:rPr lang="da-DK" dirty="0" err="1"/>
+              <a:t>bla</a:t>
             </a:r>
             <a:r>
               <a:rPr lang="da-DK" baseline="0" dirty="0"/>
-              <a:t> hvad vi skal have med som krav</a:t>
-            </a:r>
-          </a:p>
-          <a:p>
-            <a:endParaRPr lang="da-DK" baseline="0" dirty="0"/>
-          </a:p>
-          <a:p>
+              <a:t> </a:t>
+            </a:r>
+            <a:r>
+              <a:rPr lang="da-DK" baseline="0" dirty="0" err="1"/>
+              <a:t>bla</a:t>
+            </a:r>
             <a:r>
               <a:rPr lang="da-DK" baseline="0" dirty="0"/>
-              <a:t>UC – 4 styks </a:t>
+              <a:t> </a:t>
+            </a:r>
+            <a:r>
+              <a:rPr lang="da-DK" baseline="0" dirty="0" err="1"/>
+              <a:t>bla</a:t>
             </a:r>
             <a:endParaRPr lang="da-DK" dirty="0"/>
           </a:p>
@@ -1513,7 +1924,7 @@
           <a:p>
             <a:fld id="{81DAF125-77CF-4549-A25B-16435FA351B7}" type="slidenum">
               <a:rPr lang="da-DK" smtClean="0"/>
-              <a:t>11</a:t>
+              <a:t>9</a:t>
             </a:fld>
             <a:endParaRPr lang="da-DK"/>
           </a:p>
@@ -1522,7 +1933,7 @@
     </p:spTree>
     <p:extLst>
       <p:ext uri="{BB962C8B-B14F-4D97-AF65-F5344CB8AC3E}">
-        <p14:creationId xmlns:p14="http://schemas.microsoft.com/office/powerpoint/2010/main" val="4183857365"/>
+        <p14:creationId xmlns:p14="http://schemas.microsoft.com/office/powerpoint/2010/main" val="746107577"/>
       </p:ext>
     </p:extLst>
   </p:cSld>
@@ -1758,7 +2169,7 @@
           <a:p>
             <a:fld id="{ACF1A1B0-862D-4909-A7DB-D8ADA062DFCA}" type="datetimeFigureOut">
               <a:rPr lang="en-US" smtClean="0"/>
-              <a:t>1/5/2017</a:t>
+              <a:t>1/6/2017</a:t>
             </a:fld>
             <a:endParaRPr lang="en-US" dirty="0"/>
           </a:p>
@@ -1967,7 +2378,7 @@
           <a:p>
             <a:fld id="{7B156144-9CB7-4E3A-B87E-A382F9BE05EF}" type="datetimeFigureOut">
               <a:rPr lang="en-US" smtClean="0"/>
-              <a:t>1/5/2017</a:t>
+              <a:t>1/6/2017</a:t>
             </a:fld>
             <a:endParaRPr lang="en-US" dirty="0"/>
           </a:p>
@@ -2223,7 +2634,7 @@
           <a:p>
             <a:fld id="{2643D55F-46AB-4791-9172-4FA8DD3A6A9C}" type="datetimeFigureOut">
               <a:rPr lang="en-US" smtClean="0"/>
-              <a:t>1/5/2017</a:t>
+              <a:t>1/6/2017</a:t>
             </a:fld>
             <a:endParaRPr lang="en-US" dirty="0"/>
           </a:p>
@@ -2393,7 +2804,7 @@
           <a:p>
             <a:fld id="{58026881-8A08-449C-8D73-E5F201F814C1}" type="datetimeFigureOut">
               <a:rPr lang="en-US" smtClean="0"/>
-              <a:t>1/5/2017</a:t>
+              <a:t>1/6/2017</a:t>
             </a:fld>
             <a:endParaRPr lang="en-US" dirty="0"/>
           </a:p>
@@ -2736,7 +3147,7 @@
           <a:p>
             <a:fld id="{1BEB5A5E-0C07-4E93-A112-D37B4D166B30}" type="datetimeFigureOut">
               <a:rPr lang="en-US" smtClean="0"/>
-              <a:t>1/5/2017</a:t>
+              <a:t>1/6/2017</a:t>
             </a:fld>
             <a:endParaRPr lang="en-US" dirty="0"/>
           </a:p>
@@ -3011,7 +3422,7 @@
           <a:p>
             <a:fld id="{9E1F71C5-DC57-4358-A1EA-30C08AF6E3C5}" type="datetimeFigureOut">
               <a:rPr lang="en-US" smtClean="0"/>
-              <a:t>1/5/2017</a:t>
+              <a:t>1/6/2017</a:t>
             </a:fld>
             <a:endParaRPr lang="en-US" dirty="0"/>
           </a:p>
@@ -3390,7 +3801,7 @@
           <a:p>
             <a:fld id="{12571DBA-DE60-4731-B773-47AAA185C143}" type="datetimeFigureOut">
               <a:rPr lang="en-US" smtClean="0"/>
-              <a:t>1/5/2017</a:t>
+              <a:t>1/6/2017</a:t>
             </a:fld>
             <a:endParaRPr lang="en-US" dirty="0"/>
           </a:p>
@@ -3508,7 +3919,7 @@
           <a:p>
             <a:fld id="{4F170639-886C-4FCF-9EAB-ABB5DA3F3F4A}" type="datetimeFigureOut">
               <a:rPr lang="en-US" smtClean="0"/>
-              <a:t>1/5/2017</a:t>
+              <a:t>1/6/2017</a:t>
             </a:fld>
             <a:endParaRPr lang="en-US" dirty="0"/>
           </a:p>
@@ -3679,7 +4090,7 @@
           <a:p>
             <a:fld id="{34C4A628-C83B-4C66-83F4-1711CE3738FD}" type="datetimeFigureOut">
               <a:rPr lang="en-US" smtClean="0"/>
-              <a:t>1/5/2017</a:t>
+              <a:t>1/6/2017</a:t>
             </a:fld>
             <a:endParaRPr lang="en-US" dirty="0"/>
           </a:p>
@@ -4033,7 +4444,7 @@
           <a:p>
             <a:fld id="{B88C1D73-9400-43CA-A37F-F9B7D00DE14C}" type="datetimeFigureOut">
               <a:rPr lang="en-US" smtClean="0"/>
-              <a:t>1/5/2017</a:t>
+              <a:t>1/6/2017</a:t>
             </a:fld>
             <a:endParaRPr lang="en-US" dirty="0"/>
           </a:p>
@@ -4410,7 +4821,7 @@
           <a:p>
             <a:fld id="{188B7711-B905-4633-B4D7-6F3A49A2E7D9}" type="datetimeFigureOut">
               <a:rPr lang="en-US" smtClean="0"/>
-              <a:t>1/5/2017</a:t>
+              <a:t>1/6/2017</a:t>
             </a:fld>
             <a:endParaRPr lang="en-US" dirty="0"/>
           </a:p>
@@ -4698,7 +5109,7 @@
             <a:fld id="{89C235CF-BDA2-4E7E-8BBD-350479985E74}" type="datetimeFigureOut">
               <a:rPr lang="en-US" smtClean="0"/>
               <a:pPr/>
-              <a:t>1/5/2017</a:t>
+              <a:t>1/6/2017</a:t>
             </a:fld>
             <a:endParaRPr lang="en-US" dirty="0"/>
           </a:p>
@@ -5326,6 +5737,111 @@
           </a:prstGeom>
         </p:spPr>
       </p:pic>
+      <p:pic>
+        <p:nvPicPr>
+          <p:cNvPr id="5" name="Billede 4"/>
+          <p:cNvPicPr>
+            <a:picLocks noChangeAspect="1"/>
+          </p:cNvPicPr>
+          <p:nvPr/>
+        </p:nvPicPr>
+        <p:blipFill rotWithShape="1">
+          <a:blip r:embed="rId3">
+            <a:extLst>
+              <a:ext uri="{BEBA8EAE-BF5A-486C-A8C5-ECC9F3942E4B}">
+                <a14:imgProps xmlns:a14="http://schemas.microsoft.com/office/drawing/2010/main">
+                  <a14:imgLayer r:embed="rId4">
+                    <a14:imgEffect>
+                      <a14:saturation sat="400000"/>
+                    </a14:imgEffect>
+                  </a14:imgLayer>
+                </a14:imgProps>
+              </a:ext>
+            </a:extLst>
+          </a:blip>
+          <a:srcRect t="18396"/>
+          <a:stretch/>
+        </p:blipFill>
+        <p:spPr>
+          <a:xfrm>
+            <a:off x="7237503" y="720850"/>
+            <a:ext cx="3918177" cy="3734771"/>
+          </a:xfrm>
+          <a:prstGeom prst="rect">
+            <a:avLst/>
+          </a:prstGeom>
+        </p:spPr>
+      </p:pic>
+      <p:pic>
+        <p:nvPicPr>
+          <p:cNvPr id="6" name="Billede 5"/>
+          <p:cNvPicPr>
+            <a:picLocks noChangeAspect="1"/>
+          </p:cNvPicPr>
+          <p:nvPr/>
+        </p:nvPicPr>
+        <p:blipFill rotWithShape="1">
+          <a:blip r:embed="rId3">
+            <a:extLst>
+              <a:ext uri="{BEBA8EAE-BF5A-486C-A8C5-ECC9F3942E4B}">
+                <a14:imgProps xmlns:a14="http://schemas.microsoft.com/office/drawing/2010/main">
+                  <a14:imgLayer r:embed="rId4">
+                    <a14:imgEffect>
+                      <a14:saturation sat="400000"/>
+                    </a14:imgEffect>
+                  </a14:imgLayer>
+                </a14:imgProps>
+              </a:ext>
+            </a:extLst>
+          </a:blip>
+          <a:srcRect t="18396"/>
+          <a:stretch/>
+        </p:blipFill>
+        <p:spPr>
+          <a:xfrm>
+            <a:off x="7237503" y="720850"/>
+            <a:ext cx="3918177" cy="3734771"/>
+          </a:xfrm>
+          <a:prstGeom prst="rect">
+            <a:avLst/>
+          </a:prstGeom>
+        </p:spPr>
+      </p:pic>
+      <p:pic>
+        <p:nvPicPr>
+          <p:cNvPr id="7" name="Billede 6"/>
+          <p:cNvPicPr>
+            <a:picLocks noChangeAspect="1"/>
+          </p:cNvPicPr>
+          <p:nvPr/>
+        </p:nvPicPr>
+        <p:blipFill rotWithShape="1">
+          <a:blip r:embed="rId3">
+            <a:extLst>
+              <a:ext uri="{BEBA8EAE-BF5A-486C-A8C5-ECC9F3942E4B}">
+                <a14:imgProps xmlns:a14="http://schemas.microsoft.com/office/drawing/2010/main">
+                  <a14:imgLayer r:embed="rId4">
+                    <a14:imgEffect>
+                      <a14:saturation sat="400000"/>
+                    </a14:imgEffect>
+                  </a14:imgLayer>
+                </a14:imgProps>
+              </a:ext>
+            </a:extLst>
+          </a:blip>
+          <a:srcRect t="18396"/>
+          <a:stretch/>
+        </p:blipFill>
+        <p:spPr>
+          <a:xfrm>
+            <a:off x="7237503" y="720849"/>
+            <a:ext cx="3918177" cy="3734771"/>
+          </a:xfrm>
+          <a:prstGeom prst="rect">
+            <a:avLst/>
+          </a:prstGeom>
+        </p:spPr>
+      </p:pic>
     </p:spTree>
     <p:extLst>
       <p:ext uri="{BB962C8B-B14F-4D97-AF65-F5344CB8AC3E}">
@@ -5473,15 +5989,39 @@
           <p:nvPr/>
         </p:nvPicPr>
         <p:blipFill>
-          <a:blip r:embed="rId2"/>
+          <a:blip r:embed="rId3"/>
           <a:stretch>
             <a:fillRect/>
           </a:stretch>
         </p:blipFill>
         <p:spPr>
           <a:xfrm>
-            <a:off x="5732522" y="2161727"/>
+            <a:off x="6059094" y="2161727"/>
             <a:ext cx="5096586" cy="3391373"/>
+          </a:xfrm>
+          <a:prstGeom prst="rect">
+            <a:avLst/>
+          </a:prstGeom>
+        </p:spPr>
+      </p:pic>
+      <p:pic>
+        <p:nvPicPr>
+          <p:cNvPr id="5" name="Billede 4"/>
+          <p:cNvPicPr>
+            <a:picLocks noChangeAspect="1"/>
+          </p:cNvPicPr>
+          <p:nvPr/>
+        </p:nvPicPr>
+        <p:blipFill>
+          <a:blip r:embed="rId4"/>
+          <a:stretch>
+            <a:fillRect/>
+          </a:stretch>
+        </p:blipFill>
+        <p:spPr>
+          <a:xfrm>
+            <a:off x="1097280" y="4542979"/>
+            <a:ext cx="4505498" cy="1326115"/>
           </a:xfrm>
           <a:prstGeom prst="rect">
             <a:avLst/>
@@ -5599,7 +6139,7 @@
         </p:blipFill>
         <p:spPr>
           <a:xfrm>
-            <a:off x="6394820" y="1845734"/>
+            <a:off x="6810456" y="1845734"/>
             <a:ext cx="3791479" cy="4020111"/>
           </a:xfrm>
           <a:prstGeom prst="rect">
@@ -5674,22 +6214,13 @@
           <a:bodyPr/>
           <a:lstStyle/>
           <a:p>
-            <a:r>
-              <a:rPr lang="da-DK" dirty="0"/>
-              <a:t>- Opdeling i genbrugelige moduler </a:t>
-            </a:r>
-          </a:p>
-          <a:p>
-            <a:r>
-              <a:rPr lang="da-DK" dirty="0"/>
-              <a:t>- Lav kobling, høj samhørighed</a:t>
-            </a:r>
+            <a:endParaRPr lang="da-DK" dirty="0"/>
           </a:p>
         </p:txBody>
       </p:sp>
       <p:pic>
         <p:nvPicPr>
-          <p:cNvPr id="6" name="Pladsholder til indhold 3"/>
+          <p:cNvPr id="7" name="Pladsholder til indhold 3"/>
           <p:cNvPicPr>
             <a:picLocks noChangeAspect="1"/>
           </p:cNvPicPr>
@@ -5703,8 +6234,8 @@
         </p:blipFill>
         <p:spPr>
           <a:xfrm>
-            <a:off x="2520430" y="2721196"/>
-            <a:ext cx="6208901" cy="2592443"/>
+            <a:off x="2548687" y="2363555"/>
+            <a:ext cx="7155585" cy="2987718"/>
           </a:xfrm>
           <a:prstGeom prst="rect">
             <a:avLst/>
@@ -5821,6 +6352,16 @@
             </a:r>
           </a:p>
           <a:p>
+            <a:pPr>
+              <a:buFont typeface="Arial" panose="020B0604020202020204" pitchFamily="34" charset="0"/>
+              <a:buChar char="•"/>
+            </a:pPr>
+            <a:r>
+              <a:rPr lang="da-DK" dirty="0"/>
+              <a:t> Tværfaglig forståelse </a:t>
+            </a:r>
+          </a:p>
+          <a:p>
             <a:endParaRPr lang="da-DK" dirty="0"/>
           </a:p>
           <a:p>
@@ -5907,6 +6448,39 @@
           </a:prstGeom>
         </p:spPr>
       </p:pic>
+      <p:sp>
+        <p:nvSpPr>
+          <p:cNvPr id="3" name="Tekstfelt 2"/>
+          <p:cNvSpPr txBox="1"/>
+          <p:nvPr/>
+        </p:nvSpPr>
+        <p:spPr>
+          <a:xfrm>
+            <a:off x="216131" y="286603"/>
+            <a:ext cx="3507971" cy="769441"/>
+          </a:xfrm>
+          <a:prstGeom prst="rect">
+            <a:avLst/>
+          </a:prstGeom>
+          <a:noFill/>
+        </p:spPr>
+        <p:txBody>
+          <a:bodyPr wrap="square" rtlCol="0">
+            <a:spAutoFit/>
+          </a:bodyPr>
+          <a:lstStyle/>
+          <a:p>
+            <a:r>
+              <a:rPr lang="da-DK" sz="4400" dirty="0">
+                <a:solidFill>
+                  <a:schemeClr val="bg1"/>
+                </a:solidFill>
+              </a:rPr>
+              <a:t>Demo</a:t>
+            </a:r>
+          </a:p>
+        </p:txBody>
+      </p:sp>
     </p:spTree>
     <p:extLst>
       <p:ext uri="{BB962C8B-B14F-4D97-AF65-F5344CB8AC3E}">
@@ -6044,7 +6618,7 @@
             </a:pPr>
             <a:r>
               <a:rPr lang="da-DK" dirty="0"/>
-              <a:t> Præsentation </a:t>
+              <a:t> Demo </a:t>
             </a:r>
           </a:p>
         </p:txBody>
@@ -6295,7 +6869,7 @@
             </a:pPr>
             <a:r>
               <a:rPr lang="da-DK" dirty="0"/>
-              <a:t> Hvordan vil en automatiseret ultralydsscanning til screening for brystkræft kunne udvikles ved brug  af robotarm og 3D kamera?</a:t>
+              <a:t> Hvordan den udvikles</a:t>
             </a:r>
           </a:p>
           <a:p>
@@ -6305,7 +6879,7 @@
             </a:pPr>
             <a:r>
               <a:rPr lang="da-DK" dirty="0"/>
-              <a:t> Hvilke omkostninger vil indførslen af en Automatisk Ultralydsscanner kunne give?</a:t>
+              <a:t> Omkostninger </a:t>
             </a:r>
           </a:p>
           <a:p>
@@ -6315,7 +6889,7 @@
             </a:pPr>
             <a:r>
               <a:rPr lang="da-DK" dirty="0"/>
-              <a:t> Hvilke konsekvenser vil en tilføjelse af Automatisk Ultralydsscanner til screeningsprogrammet     have?</a:t>
+              <a:t> Konsekvenser ved screeninger </a:t>
             </a:r>
           </a:p>
           <a:p>
@@ -6325,14 +6899,8 @@
             </a:pPr>
             <a:r>
               <a:rPr lang="da-DK" dirty="0"/>
-              <a:t> Hvad kræves for at få Automatisk Ultralydsscanner CE-mærket?</a:t>
-            </a:r>
-          </a:p>
-          <a:p>
-            <a:pPr marL="36900" indent="0">
-              <a:buNone/>
-            </a:pPr>
-            <a:endParaRPr lang="da-DK" dirty="0"/>
+              <a:t> Medicinsk godkendelse </a:t>
+            </a:r>
           </a:p>
         </p:txBody>
       </p:sp>
@@ -6415,7 +6983,7 @@
             </a:pPr>
             <a:r>
               <a:rPr lang="da-DK" dirty="0"/>
-              <a:t> Detektering af brystområde, men ikke fuld scanning </a:t>
+              <a:t> Detektering af brystområde - ikke fuld scanning </a:t>
             </a:r>
           </a:p>
           <a:p>
@@ -6425,7 +6993,7 @@
             </a:pPr>
             <a:r>
               <a:rPr lang="da-DK" dirty="0"/>
-              <a:t> Omkostninger forbundet med screeningsprogrammet </a:t>
+              <a:t> Screeningsprogrammets omkostninger </a:t>
             </a:r>
           </a:p>
           <a:p>
@@ -6435,7 +7003,7 @@
             </a:pPr>
             <a:r>
               <a:rPr lang="da-DK" dirty="0"/>
-              <a:t> Flere kræftformer findes, højere overlevelsesproces men også overdiagnosticering </a:t>
+              <a:t> Flere kræftformer findes, højere overlevelsesproces, overdiagnosticering </a:t>
             </a:r>
           </a:p>
           <a:p>
@@ -6523,67 +7091,24 @@
             </a:r>
           </a:p>
           <a:p>
-            <a:r>
-              <a:rPr lang="da-DK" b="1" dirty="0"/>
-              <a:t>- Vejen til CE-mærkning</a:t>
-            </a:r>
-          </a:p>
-          <a:p>
-            <a:pPr lvl="1"/>
-            <a:r>
-              <a:rPr lang="da-DK" b="1" dirty="0"/>
-              <a:t>Klassificering</a:t>
-            </a:r>
-          </a:p>
-          <a:p>
-            <a:pPr lvl="1"/>
-            <a:r>
-              <a:rPr lang="da-DK" b="1" dirty="0"/>
-              <a:t>Overholde krav om sikkerhed og ydeevne</a:t>
-            </a:r>
-          </a:p>
-          <a:p>
-            <a:pPr lvl="1"/>
-            <a:r>
-              <a:rPr lang="da-DK" b="1" dirty="0"/>
-              <a:t>Dokumentation til hvordan kravene er overholdt</a:t>
-            </a:r>
-          </a:p>
-          <a:p>
-            <a:pPr lvl="1"/>
-            <a:r>
-              <a:rPr lang="da-DK" b="1" dirty="0"/>
-              <a:t>Valg af bemyndiget organ </a:t>
-            </a:r>
-          </a:p>
-          <a:p>
-            <a:pPr lvl="1"/>
-            <a:r>
-              <a:rPr lang="da-DK" b="1" dirty="0"/>
-              <a:t>Markedsovervågningssystem</a:t>
-            </a:r>
-          </a:p>
-          <a:p>
-            <a:pPr lvl="1"/>
-            <a:r>
-              <a:rPr lang="da-DK" b="1" dirty="0"/>
-              <a:t>Underskrivelse af </a:t>
-            </a:r>
-            <a:r>
-              <a:rPr lang="da-DK" b="1" dirty="0" err="1"/>
-              <a:t>overenstemmelseserklæring</a:t>
-            </a:r>
-            <a:endParaRPr lang="da-DK" b="1" dirty="0"/>
-          </a:p>
-          <a:p>
-            <a:pPr lvl="1"/>
-            <a:r>
-              <a:rPr lang="da-DK" b="1" dirty="0"/>
-              <a:t>Registrering hos lægemiddelstyrelsen. </a:t>
-            </a:r>
-          </a:p>
-          <a:p>
-            <a:endParaRPr lang="da-DK" dirty="0"/>
+            <a:pPr>
+              <a:buFont typeface="Arial" panose="020B0604020202020204" pitchFamily="34" charset="0"/>
+              <a:buChar char="•"/>
+            </a:pPr>
+            <a:r>
+              <a:rPr lang="da-DK" dirty="0"/>
+              <a:t> Hvorfor </a:t>
+            </a:r>
+          </a:p>
+          <a:p>
+            <a:pPr>
+              <a:buFont typeface="Arial" panose="020B0604020202020204" pitchFamily="34" charset="0"/>
+              <a:buChar char="•"/>
+            </a:pPr>
+            <a:r>
+              <a:rPr lang="da-DK" dirty="0"/>
+              <a:t> Hvordan</a:t>
+            </a:r>
           </a:p>
           <a:p>
             <a:endParaRPr lang="da-DK" dirty="0"/>
@@ -6955,7 +7480,7 @@
         </p:blipFill>
         <p:spPr>
           <a:xfrm>
-            <a:off x="3454717" y="2670401"/>
+            <a:off x="3454717" y="2804901"/>
             <a:ext cx="5343525" cy="2105025"/>
           </a:xfrm>
           <a:prstGeom prst="rect">

</xml_diff>

<commit_message>
Mine notater til mine slides
</commit_message>
<xml_diff>
--- a/Præsentation_Eksamen.pptx
+++ b/Præsentation_Eksamen.pptx
@@ -232,7 +232,7 @@
           <a:p>
             <a:fld id="{6AF9F838-B633-4D47-BC11-C4B614E0B93C}" type="datetimeFigureOut">
               <a:rPr lang="da-DK" smtClean="0"/>
-              <a:t>06-01-2017</a:t>
+              <a:t>09-01-2017</a:t>
             </a:fld>
             <a:endParaRPr lang="da-DK"/>
           </a:p>
@@ -569,7 +569,7 @@
               <a:rPr lang="da-DK" smtClean="0"/>
               <a:t>1</a:t>
             </a:fld>
-            <a:endParaRPr lang="da-DK"/>
+            <a:endParaRPr lang="da-DK" dirty="0"/>
           </a:p>
         </p:txBody>
       </p:sp>
@@ -1154,7 +1154,7 @@
               <a:rPr lang="da-DK" smtClean="0"/>
               <a:t>2</a:t>
             </a:fld>
-            <a:endParaRPr lang="da-DK"/>
+            <a:endParaRPr lang="da-DK" dirty="0"/>
           </a:p>
         </p:txBody>
       </p:sp>
@@ -1700,9 +1700,86 @@
           <a:lstStyle/>
           <a:p>
             <a:r>
-              <a:rPr lang="da-DK" dirty="0"/>
-              <a:t>Charlotte</a:t>
-            </a:r>
+              <a:rPr lang="da-DK" baseline="0" dirty="0"/>
+              <a:t>Vi har set på det scenarie, hvor man vælger at udvide screeningsprogrammet. </a:t>
+            </a:r>
+          </a:p>
+          <a:p>
+            <a:r>
+              <a:rPr lang="da-DK" baseline="0" dirty="0"/>
+              <a:t>Dertil har vi lavet en </a:t>
+            </a:r>
+            <a:r>
+              <a:rPr lang="da-DK" baseline="0" dirty="0" err="1"/>
+              <a:t>break-even</a:t>
+            </a:r>
+            <a:r>
+              <a:rPr lang="da-DK" baseline="0" dirty="0"/>
+              <a:t> analyse, hvor automatisk ultralydsscanner sammenlignes med en scanning foretaget af en radiolog. </a:t>
+            </a:r>
+          </a:p>
+          <a:p>
+            <a:r>
+              <a:rPr lang="da-DK" baseline="0" dirty="0"/>
+              <a:t>Vi fandt ud af, at transporttid er en vigtig faktor efter interview med radiolog Lars </a:t>
+            </a:r>
+            <a:r>
+              <a:rPr lang="da-DK" baseline="0" dirty="0" err="1"/>
+              <a:t>Bolvig</a:t>
+            </a:r>
+            <a:r>
+              <a:rPr lang="da-DK" baseline="0" dirty="0"/>
+              <a:t>, og derfor har vi opstillet et scenarie hvor transport er variabel. </a:t>
+            </a:r>
+          </a:p>
+          <a:p>
+            <a:r>
+              <a:rPr lang="da-DK" baseline="0" dirty="0"/>
+              <a:t>Omkostningerne for tid, indkøb mm. blev gjort op, og ud fra skemaet kan man se, at jo længere transporttid for radiologen, jo dyrere bliver scanningen. </a:t>
+            </a:r>
+          </a:p>
+          <a:p>
+            <a:r>
+              <a:rPr lang="da-DK" baseline="0" dirty="0"/>
+              <a:t>Sidste </a:t>
+            </a:r>
+            <a:r>
+              <a:rPr lang="da-DK" baseline="0" dirty="0" err="1"/>
+              <a:t>kolonnne</a:t>
+            </a:r>
+            <a:r>
+              <a:rPr lang="da-DK" baseline="0" dirty="0"/>
+              <a:t> viser så breakeven scanninger, dvs. antal scanninger før omkostningerne for indkøb af automatisk ultralydsscanner er lig med scanning foretaget af radiolog. </a:t>
+            </a:r>
+          </a:p>
+          <a:p>
+            <a:endParaRPr lang="da-DK" baseline="0" dirty="0"/>
+          </a:p>
+          <a:p>
+            <a:r>
+              <a:rPr lang="da-DK" baseline="0" dirty="0"/>
+              <a:t>Det skal nævnes, at analysen kun er et skøn, da der er mange uforudsete udgifter kombineret med en scanning. Bl.a. indkaldelse af patient mm. det er derfor valgt at simplificerer dette og sammenligne de </a:t>
+            </a:r>
+            <a:r>
+              <a:rPr lang="da-DK" baseline="0" dirty="0" err="1"/>
+              <a:t>umiddelbarte</a:t>
+            </a:r>
+            <a:r>
+              <a:rPr lang="da-DK" baseline="0" dirty="0"/>
+              <a:t> forskelle som tid for radiografer og radiologer. </a:t>
+            </a:r>
+          </a:p>
+          <a:p>
+            <a:endParaRPr lang="da-DK" baseline="0" dirty="0"/>
+          </a:p>
+          <a:p>
+            <a:r>
+              <a:rPr lang="da-DK" baseline="0" dirty="0"/>
+              <a:t>Selve UR10 robotten koster tæt på de 200.000 kr. Derudover vil man skulle sætte penge af til at oplære radiografer, vedligeholdelse mm</a:t>
+            </a:r>
+          </a:p>
+          <a:p>
+            <a:endParaRPr lang="da-DK" dirty="0"/>
           </a:p>
         </p:txBody>
       </p:sp>
@@ -1788,7 +1865,63 @@
           <a:p>
             <a:r>
               <a:rPr lang="da-DK" dirty="0"/>
-              <a:t>Charlotte</a:t>
+              <a:t>Vi</a:t>
+            </a:r>
+            <a:r>
+              <a:rPr lang="da-DK" baseline="0" dirty="0"/>
+              <a:t> har også kigget på, om en kombination af ultralyd og røntgen – og i det hele taget screeninger for brystkræft er omkostningseffektive. </a:t>
+            </a:r>
+          </a:p>
+          <a:p>
+            <a:r>
+              <a:rPr lang="da-DK" baseline="0" dirty="0"/>
+              <a:t>Derfor lavede vi et litteraturstudie med både national og internationale litteratur. </a:t>
+            </a:r>
+          </a:p>
+          <a:p>
+            <a:r>
+              <a:rPr lang="da-DK" baseline="0" dirty="0"/>
+              <a:t>Forskningen peger på, at en kombination af ultralyd og røntgen opdager tidligere stadier af kræft, hvor det også er billigere at behandle og overlevelsesprocenten er højere. </a:t>
+            </a:r>
+          </a:p>
+          <a:p>
+            <a:r>
+              <a:rPr lang="da-DK" baseline="0" dirty="0"/>
+              <a:t>Et BMC Cancer studie beskrev den </a:t>
+            </a:r>
+            <a:r>
+              <a:rPr lang="da-DK" sz="1200" b="0" i="0" u="none" strike="noStrike" kern="1200" baseline="0" dirty="0">
+                <a:solidFill>
+                  <a:schemeClr val="tx1"/>
+                </a:solidFill>
+                <a:latin typeface="+mn-lt"/>
+                <a:ea typeface="+mn-ea"/>
+                <a:cs typeface="+mn-cs"/>
+              </a:rPr>
+              <a:t>positive prædikative værdi til at være 10,3 % ved en kombination af ultralyd og røntgen, mens den ved almindelig mammografi er 38%. Det viser, at overdiagnosticering er et problem, og der kan gives unødvendig behandling pga. de mange falske positive resultater. </a:t>
+            </a:r>
+          </a:p>
+          <a:p>
+            <a:endParaRPr lang="da-DK" sz="1200" b="0" i="0" u="none" strike="noStrike" kern="1200" baseline="0" dirty="0">
+              <a:solidFill>
+                <a:schemeClr val="tx1"/>
+              </a:solidFill>
+              <a:latin typeface="+mn-lt"/>
+              <a:ea typeface="+mn-ea"/>
+              <a:cs typeface="+mn-cs"/>
+            </a:endParaRPr>
+          </a:p>
+          <a:p>
+            <a:r>
+              <a:rPr lang="da-DK" sz="1200" b="0" i="0" u="none" strike="noStrike" kern="1200" baseline="0" dirty="0">
+                <a:solidFill>
+                  <a:schemeClr val="tx1"/>
+                </a:solidFill>
+                <a:latin typeface="+mn-lt"/>
+                <a:ea typeface="+mn-ea"/>
+                <a:cs typeface="+mn-cs"/>
+              </a:rPr>
+              <a:t>Danmark har ikke en officiel grænse for QALY, så det kan derfor være svært at sige, om det er omkostningseffektivt, men givet de pejlemærker fra Sundhedsstyrelsen tyder selve screeningsprogrammet på at være omkostningseffektivt, mens kombinationen af ultralyd og røntgen ikke er inden for pejlemærkerne. </a:t>
             </a:r>
           </a:p>
         </p:txBody>
@@ -1812,7 +1945,7 @@
               <a:rPr lang="da-DK" smtClean="0"/>
               <a:t>8</a:t>
             </a:fld>
-            <a:endParaRPr lang="da-DK"/>
+            <a:endParaRPr lang="da-DK" dirty="0"/>
           </a:p>
         </p:txBody>
       </p:sp>
@@ -1881,29 +2014,18 @@
           <a:p>
             <a:r>
               <a:rPr lang="da-DK" dirty="0"/>
-              <a:t>Interesseområder, fremtid, gav mening efter kompetencer </a:t>
-            </a:r>
-            <a:r>
-              <a:rPr lang="da-DK" dirty="0" err="1"/>
-              <a:t>bla</a:t>
+              <a:t>Men hvis</a:t>
             </a:r>
             <a:r>
               <a:rPr lang="da-DK" baseline="0" dirty="0"/>
-              <a:t> </a:t>
-            </a:r>
-            <a:r>
-              <a:rPr lang="da-DK" baseline="0" dirty="0" err="1"/>
-              <a:t>bla</a:t>
-            </a:r>
-            <a:r>
-              <a:rPr lang="da-DK" baseline="0" dirty="0"/>
-              <a:t> </a:t>
-            </a:r>
-            <a:r>
-              <a:rPr lang="da-DK" baseline="0" dirty="0" err="1"/>
-              <a:t>bla</a:t>
-            </a:r>
-            <a:endParaRPr lang="da-DK" dirty="0"/>
+              <a:t> vi skal se på de metoder vi har anvendt for at fuldføre projektarbejdet, så har vi valgt at lave en arbejdsfordeling på baggrund af interesseområder, kompetencer og også efter, hvad vi gerne vil arbejde videre med i et fremtidigt arbejde. </a:t>
+            </a:r>
+          </a:p>
+          <a:p>
+            <a:endParaRPr lang="da-DK" baseline="0" dirty="0"/>
+          </a:p>
+          <a:p>
+            <a:endParaRPr lang="da-DK" baseline="0" dirty="0"/>
           </a:p>
         </p:txBody>
       </p:sp>
@@ -2169,7 +2291,7 @@
           <a:p>
             <a:fld id="{ACF1A1B0-862D-4909-A7DB-D8ADA062DFCA}" type="datetimeFigureOut">
               <a:rPr lang="en-US" smtClean="0"/>
-              <a:t>1/6/2017</a:t>
+              <a:t>1/9/2017</a:t>
             </a:fld>
             <a:endParaRPr lang="en-US" dirty="0"/>
           </a:p>
@@ -2378,7 +2500,7 @@
           <a:p>
             <a:fld id="{7B156144-9CB7-4E3A-B87E-A382F9BE05EF}" type="datetimeFigureOut">
               <a:rPr lang="en-US" smtClean="0"/>
-              <a:t>1/6/2017</a:t>
+              <a:t>1/9/2017</a:t>
             </a:fld>
             <a:endParaRPr lang="en-US" dirty="0"/>
           </a:p>
@@ -2634,7 +2756,7 @@
           <a:p>
             <a:fld id="{2643D55F-46AB-4791-9172-4FA8DD3A6A9C}" type="datetimeFigureOut">
               <a:rPr lang="en-US" smtClean="0"/>
-              <a:t>1/6/2017</a:t>
+              <a:t>1/9/2017</a:t>
             </a:fld>
             <a:endParaRPr lang="en-US" dirty="0"/>
           </a:p>
@@ -2804,7 +2926,7 @@
           <a:p>
             <a:fld id="{58026881-8A08-449C-8D73-E5F201F814C1}" type="datetimeFigureOut">
               <a:rPr lang="en-US" smtClean="0"/>
-              <a:t>1/6/2017</a:t>
+              <a:t>1/9/2017</a:t>
             </a:fld>
             <a:endParaRPr lang="en-US" dirty="0"/>
           </a:p>
@@ -3147,7 +3269,7 @@
           <a:p>
             <a:fld id="{1BEB5A5E-0C07-4E93-A112-D37B4D166B30}" type="datetimeFigureOut">
               <a:rPr lang="en-US" smtClean="0"/>
-              <a:t>1/6/2017</a:t>
+              <a:t>1/9/2017</a:t>
             </a:fld>
             <a:endParaRPr lang="en-US" dirty="0"/>
           </a:p>
@@ -3422,7 +3544,7 @@
           <a:p>
             <a:fld id="{9E1F71C5-DC57-4358-A1EA-30C08AF6E3C5}" type="datetimeFigureOut">
               <a:rPr lang="en-US" smtClean="0"/>
-              <a:t>1/6/2017</a:t>
+              <a:t>1/9/2017</a:t>
             </a:fld>
             <a:endParaRPr lang="en-US" dirty="0"/>
           </a:p>
@@ -3801,7 +3923,7 @@
           <a:p>
             <a:fld id="{12571DBA-DE60-4731-B773-47AAA185C143}" type="datetimeFigureOut">
               <a:rPr lang="en-US" smtClean="0"/>
-              <a:t>1/6/2017</a:t>
+              <a:t>1/9/2017</a:t>
             </a:fld>
             <a:endParaRPr lang="en-US" dirty="0"/>
           </a:p>
@@ -3919,7 +4041,7 @@
           <a:p>
             <a:fld id="{4F170639-886C-4FCF-9EAB-ABB5DA3F3F4A}" type="datetimeFigureOut">
               <a:rPr lang="en-US" smtClean="0"/>
-              <a:t>1/6/2017</a:t>
+              <a:t>1/9/2017</a:t>
             </a:fld>
             <a:endParaRPr lang="en-US" dirty="0"/>
           </a:p>
@@ -4090,7 +4212,7 @@
           <a:p>
             <a:fld id="{34C4A628-C83B-4C66-83F4-1711CE3738FD}" type="datetimeFigureOut">
               <a:rPr lang="en-US" smtClean="0"/>
-              <a:t>1/6/2017</a:t>
+              <a:t>1/9/2017</a:t>
             </a:fld>
             <a:endParaRPr lang="en-US" dirty="0"/>
           </a:p>
@@ -4444,7 +4566,7 @@
           <a:p>
             <a:fld id="{B88C1D73-9400-43CA-A37F-F9B7D00DE14C}" type="datetimeFigureOut">
               <a:rPr lang="en-US" smtClean="0"/>
-              <a:t>1/6/2017</a:t>
+              <a:t>1/9/2017</a:t>
             </a:fld>
             <a:endParaRPr lang="en-US" dirty="0"/>
           </a:p>
@@ -4821,7 +4943,7 @@
           <a:p>
             <a:fld id="{188B7711-B905-4633-B4D7-6F3A49A2E7D9}" type="datetimeFigureOut">
               <a:rPr lang="en-US" smtClean="0"/>
-              <a:t>1/6/2017</a:t>
+              <a:t>1/9/2017</a:t>
             </a:fld>
             <a:endParaRPr lang="en-US" dirty="0"/>
           </a:p>
@@ -5109,7 +5231,7 @@
             <a:fld id="{89C235CF-BDA2-4E7E-8BBD-350479985E74}" type="datetimeFigureOut">
               <a:rPr lang="en-US" smtClean="0"/>
               <a:pPr/>
-              <a:t>1/6/2017</a:t>
+              <a:t>1/9/2017</a:t>
             </a:fld>
             <a:endParaRPr lang="en-US" dirty="0"/>
           </a:p>
@@ -5694,11 +5816,8 @@
           <a:p>
             <a:r>
               <a:rPr lang="da-DK" dirty="0"/>
-              <a:t>Bachelorprojekt 16118</a:t>
-            </a:r>
-          </a:p>
-          <a:p>
-            <a:endParaRPr lang="da-DK" dirty="0"/>
+              <a:t>Bachelorprojekt for Diplomingeniører I ST og IKT</a:t>
+            </a:r>
           </a:p>
         </p:txBody>
       </p:sp>
@@ -6703,23 +6822,7 @@
             </a:pPr>
             <a:r>
               <a:rPr lang="da-DK" dirty="0"/>
-              <a:t> Søren Pallesen fra </a:t>
-            </a:r>
-            <a:r>
-              <a:rPr lang="da-DK" dirty="0" err="1"/>
-              <a:t>Robotic</a:t>
-            </a:r>
-            <a:r>
-              <a:rPr lang="da-DK" dirty="0"/>
-              <a:t> </a:t>
-            </a:r>
-            <a:r>
-              <a:rPr lang="da-DK" dirty="0" err="1"/>
-              <a:t>Ultrasound</a:t>
-            </a:r>
-            <a:r>
-              <a:rPr lang="da-DK" dirty="0"/>
-              <a:t> </a:t>
+              <a:t> Søren Pallesen fra Robotic Ultrasound </a:t>
             </a:r>
           </a:p>
           <a:p>
@@ -6759,19 +6862,11 @@
             </a:pPr>
             <a:r>
               <a:rPr lang="da-DK" dirty="0"/>
-              <a:t> </a:t>
+              <a:t> Proof of </a:t>
             </a:r>
             <a:r>
               <a:rPr lang="da-DK" dirty="0" err="1"/>
-              <a:t>Proof</a:t>
-            </a:r>
-            <a:r>
-              <a:rPr lang="da-DK" dirty="0"/>
-              <a:t> of </a:t>
-            </a:r>
-            <a:r>
-              <a:rPr lang="da-DK" dirty="0" err="1"/>
-              <a:t>concept</a:t>
+              <a:t>Concept</a:t>
             </a:r>
             <a:endParaRPr lang="da-DK" dirty="0"/>
           </a:p>
@@ -7304,7 +7399,7 @@
           <a:p>
             <a:r>
               <a:rPr lang="da-DK" dirty="0"/>
-              <a:t>Analyse</a:t>
+              <a:t>Analyser</a:t>
             </a:r>
           </a:p>
         </p:txBody>

</xml_diff>

<commit_message>
rettelser til power point
</commit_message>
<xml_diff>
--- a/Præsentation_Eksamen.pptx
+++ b/Præsentation_Eksamen.pptx
@@ -1132,6 +1132,25 @@
               <a:rPr lang="da-DK" dirty="0"/>
               <a:t>Charlotte</a:t>
             </a:r>
+          </a:p>
+          <a:p>
+            <a:r>
+              <a:rPr lang="da-DK" dirty="0"/>
+              <a:t>Ved </a:t>
+            </a:r>
+            <a:r>
+              <a:rPr lang="da-DK" dirty="0" err="1"/>
+              <a:t>demostrationen</a:t>
+            </a:r>
+            <a:r>
+              <a:rPr lang="da-DK" dirty="0"/>
+              <a:t> forventer vi, at vi går over i vores bachelorlokale</a:t>
+            </a:r>
+            <a:r>
+              <a:rPr lang="da-DK" baseline="0" dirty="0"/>
+              <a:t>. </a:t>
+            </a:r>
+            <a:endParaRPr lang="da-DK" dirty="0"/>
           </a:p>
         </p:txBody>
       </p:sp>
@@ -5819,6 +5838,12 @@
               <a:t>Bachelorprojekt for Diplomingeniører I ST og IKT</a:t>
             </a:r>
           </a:p>
+          <a:p>
+            <a:r>
+              <a:rPr lang="da-DK" dirty="0"/>
+              <a:t>Af Marie, Mathias &amp; Charlotte</a:t>
+            </a:r>
+          </a:p>
         </p:txBody>
       </p:sp>
       <p:pic>
@@ -6219,12 +6244,8 @@
               <a:buChar char="•"/>
             </a:pPr>
             <a:r>
-              <a:rPr lang="da-DK" dirty="0" err="1"/>
-              <a:t>Use</a:t>
-            </a:r>
-            <a:r>
-              <a:rPr lang="da-DK" dirty="0"/>
-              <a:t> cases </a:t>
+              <a:rPr lang="da-DK" dirty="0"/>
+              <a:t> Funktionelle krav </a:t>
             </a:r>
           </a:p>
           <a:p>
@@ -6234,7 +6255,17 @@
             </a:pPr>
             <a:r>
               <a:rPr lang="da-DK" dirty="0"/>
-              <a:t>Brugerundersøgelser</a:t>
+              <a:t> Ikke funktionelle krav</a:t>
+            </a:r>
+          </a:p>
+          <a:p>
+            <a:pPr>
+              <a:buFont typeface="Arial" panose="020B0604020202020204" pitchFamily="34" charset="0"/>
+              <a:buChar char="•"/>
+            </a:pPr>
+            <a:r>
+              <a:rPr lang="da-DK" dirty="0"/>
+              <a:t> Brugerundersøgelser</a:t>
             </a:r>
           </a:p>
           <a:p>
@@ -6258,7 +6289,7 @@
         </p:blipFill>
         <p:spPr>
           <a:xfrm>
-            <a:off x="6810456" y="1845734"/>
+            <a:off x="6537500" y="1848983"/>
             <a:ext cx="3791479" cy="4020111"/>
           </a:xfrm>
           <a:prstGeom prst="rect">
@@ -6822,7 +6853,23 @@
             </a:pPr>
             <a:r>
               <a:rPr lang="da-DK" dirty="0"/>
-              <a:t> Søren Pallesen fra Robotic Ultrasound </a:t>
+              <a:t> </a:t>
+            </a:r>
+            <a:r>
+              <a:rPr lang="da-DK" dirty="0" err="1"/>
+              <a:t>Cand.scient.med</a:t>
+            </a:r>
+            <a:r>
+              <a:rPr lang="da-DK" dirty="0"/>
+              <a:t>. Søren Pallesen stifter af </a:t>
+            </a:r>
+            <a:r>
+              <a:rPr lang="da-DK" dirty="0" err="1"/>
+              <a:t>Robotic</a:t>
+            </a:r>
+            <a:r>
+              <a:rPr lang="da-DK" dirty="0"/>
+              <a:t> Ultrasound </a:t>
             </a:r>
           </a:p>
           <a:p>
@@ -6854,24 +6901,6 @@
               <a:rPr lang="da-DK" dirty="0"/>
               <a:t> Udvidelse af screeninger for brystkræft</a:t>
             </a:r>
-          </a:p>
-          <a:p>
-            <a:pPr>
-              <a:buFont typeface="Arial" panose="020B0604020202020204" pitchFamily="34" charset="0"/>
-              <a:buChar char="•"/>
-            </a:pPr>
-            <a:r>
-              <a:rPr lang="da-DK" dirty="0"/>
-              <a:t> Proof of </a:t>
-            </a:r>
-            <a:r>
-              <a:rPr lang="da-DK" dirty="0" err="1"/>
-              <a:t>Concept</a:t>
-            </a:r>
-            <a:endParaRPr lang="da-DK" dirty="0"/>
-          </a:p>
-          <a:p>
-            <a:endParaRPr lang="da-DK" dirty="0"/>
           </a:p>
           <a:p>
             <a:endParaRPr lang="da-DK" b="1" dirty="0"/>
@@ -7078,7 +7107,7 @@
             </a:pPr>
             <a:r>
               <a:rPr lang="da-DK" dirty="0"/>
-              <a:t> Detektering af brystområde - ikke fuld scanning </a:t>
+              <a:t> Detektering af brystområde - ikke fuld ultralydsscanning </a:t>
             </a:r>
           </a:p>
           <a:p>
@@ -7192,7 +7221,7 @@
             </a:pPr>
             <a:r>
               <a:rPr lang="da-DK" dirty="0"/>
-              <a:t> Hvorfor </a:t>
+              <a:t> Hvad er det? </a:t>
             </a:r>
           </a:p>
           <a:p>
@@ -7202,7 +7231,17 @@
             </a:pPr>
             <a:r>
               <a:rPr lang="da-DK" dirty="0"/>
-              <a:t> Hvordan</a:t>
+              <a:t> Hvorfor er det lavet? </a:t>
+            </a:r>
+          </a:p>
+          <a:p>
+            <a:pPr>
+              <a:buFont typeface="Arial" panose="020B0604020202020204" pitchFamily="34" charset="0"/>
+              <a:buChar char="•"/>
+            </a:pPr>
+            <a:r>
+              <a:rPr lang="da-DK" dirty="0"/>
+              <a:t> Hvordan er det lavet? </a:t>
             </a:r>
           </a:p>
           <a:p>
@@ -7210,6 +7249,47 @@
           </a:p>
         </p:txBody>
       </p:sp>
+      <p:pic>
+        <p:nvPicPr>
+          <p:cNvPr id="1026" name="Picture 2" descr="Image result for CE mærkning"/>
+          <p:cNvPicPr>
+            <a:picLocks noChangeAspect="1" noChangeArrowheads="1"/>
+          </p:cNvPicPr>
+          <p:nvPr/>
+        </p:nvPicPr>
+        <p:blipFill>
+          <a:blip r:embed="rId3">
+            <a:extLst>
+              <a:ext uri="{28A0092B-C50C-407E-A947-70E740481C1C}">
+                <a14:useLocalDpi xmlns:a14="http://schemas.microsoft.com/office/drawing/2010/main" val="0"/>
+              </a:ext>
+            </a:extLst>
+          </a:blip>
+          <a:srcRect/>
+          <a:stretch>
+            <a:fillRect/>
+          </a:stretch>
+        </p:blipFill>
+        <p:spPr bwMode="auto">
+          <a:xfrm>
+            <a:off x="4945939" y="1952414"/>
+            <a:ext cx="6648450" cy="3810000"/>
+          </a:xfrm>
+          <a:prstGeom prst="rect">
+            <a:avLst/>
+          </a:prstGeom>
+          <a:noFill/>
+          <a:extLst>
+            <a:ext uri="{909E8E84-426E-40DD-AFC4-6F175D3DCCD1}">
+              <a14:hiddenFill xmlns:a14="http://schemas.microsoft.com/office/drawing/2010/main">
+                <a:solidFill>
+                  <a:srgbClr val="FFFFFF"/>
+                </a:solidFill>
+              </a14:hiddenFill>
+            </a:ext>
+          </a:extLst>
+        </p:spPr>
+      </p:pic>
     </p:spTree>
     <p:extLst>
       <p:ext uri="{BB962C8B-B14F-4D97-AF65-F5344CB8AC3E}">

</xml_diff>

<commit_message>
Ny version af fremlæggelse
</commit_message>
<xml_diff>
--- a/Præsentation_Eksamen.pptx
+++ b/Præsentation_Eksamen.pptx
@@ -232,7 +232,7 @@
           <a:p>
             <a:fld id="{6AF9F838-B633-4D47-BC11-C4B614E0B93C}" type="datetimeFigureOut">
               <a:rPr lang="da-DK" smtClean="0"/>
-              <a:t>09-01-2017</a:t>
+              <a:t>10-01-2017</a:t>
             </a:fld>
             <a:endParaRPr lang="da-DK"/>
           </a:p>
@@ -1785,7 +1785,7 @@
             </a:r>
             <a:r>
               <a:rPr lang="da-DK" baseline="0" dirty="0"/>
-              <a:t> forskelle som tid for radiografer og radiologer. </a:t>
+              <a:t> forskelle som tid for radiografer og radiologer. Tallene for den gennemsnitlige tid er et estimat af en radiolog og radiograf – men det ville styrke analysen at have flere radiologers estimat. </a:t>
             </a:r>
           </a:p>
           <a:p>
@@ -2037,13 +2037,12 @@
             </a:r>
             <a:r>
               <a:rPr lang="da-DK" baseline="0" dirty="0"/>
-              <a:t> vi skal se på de metoder vi har anvendt for at fuldføre projektarbejdet, så har vi valgt at lave en arbejdsfordeling på baggrund af interesseområder, kompetencer og også efter, hvad vi gerne vil arbejde videre med i et fremtidigt arbejde. </a:t>
-            </a:r>
-          </a:p>
-          <a:p>
-            <a:endParaRPr lang="da-DK" baseline="0" dirty="0"/>
-          </a:p>
-          <a:p>
+              <a:t> vi skal se på de metoder vi har anvendt for at fuldføre projektarbejdet, så har vi valgt at lave en arbejdsfordeling på baggrund af interesseområder, kompetencer og også efter, hvad vi gerne vil arbejde videre med i et fremtidigt arbejde</a:t>
+            </a:r>
+            <a:r>
+              <a:rPr lang="da-DK" baseline="0"/>
+              <a:t>. </a:t>
+            </a:r>
             <a:endParaRPr lang="da-DK" baseline="0" dirty="0"/>
           </a:p>
         </p:txBody>
@@ -2310,7 +2309,7 @@
           <a:p>
             <a:fld id="{ACF1A1B0-862D-4909-A7DB-D8ADA062DFCA}" type="datetimeFigureOut">
               <a:rPr lang="en-US" smtClean="0"/>
-              <a:t>1/9/2017</a:t>
+              <a:t>1/10/2017</a:t>
             </a:fld>
             <a:endParaRPr lang="en-US" dirty="0"/>
           </a:p>
@@ -2519,7 +2518,7 @@
           <a:p>
             <a:fld id="{7B156144-9CB7-4E3A-B87E-A382F9BE05EF}" type="datetimeFigureOut">
               <a:rPr lang="en-US" smtClean="0"/>
-              <a:t>1/9/2017</a:t>
+              <a:t>1/10/2017</a:t>
             </a:fld>
             <a:endParaRPr lang="en-US" dirty="0"/>
           </a:p>
@@ -2775,7 +2774,7 @@
           <a:p>
             <a:fld id="{2643D55F-46AB-4791-9172-4FA8DD3A6A9C}" type="datetimeFigureOut">
               <a:rPr lang="en-US" smtClean="0"/>
-              <a:t>1/9/2017</a:t>
+              <a:t>1/10/2017</a:t>
             </a:fld>
             <a:endParaRPr lang="en-US" dirty="0"/>
           </a:p>
@@ -2945,7 +2944,7 @@
           <a:p>
             <a:fld id="{58026881-8A08-449C-8D73-E5F201F814C1}" type="datetimeFigureOut">
               <a:rPr lang="en-US" smtClean="0"/>
-              <a:t>1/9/2017</a:t>
+              <a:t>1/10/2017</a:t>
             </a:fld>
             <a:endParaRPr lang="en-US" dirty="0"/>
           </a:p>
@@ -3288,7 +3287,7 @@
           <a:p>
             <a:fld id="{1BEB5A5E-0C07-4E93-A112-D37B4D166B30}" type="datetimeFigureOut">
               <a:rPr lang="en-US" smtClean="0"/>
-              <a:t>1/9/2017</a:t>
+              <a:t>1/10/2017</a:t>
             </a:fld>
             <a:endParaRPr lang="en-US" dirty="0"/>
           </a:p>
@@ -3563,7 +3562,7 @@
           <a:p>
             <a:fld id="{9E1F71C5-DC57-4358-A1EA-30C08AF6E3C5}" type="datetimeFigureOut">
               <a:rPr lang="en-US" smtClean="0"/>
-              <a:t>1/9/2017</a:t>
+              <a:t>1/10/2017</a:t>
             </a:fld>
             <a:endParaRPr lang="en-US" dirty="0"/>
           </a:p>
@@ -3942,7 +3941,7 @@
           <a:p>
             <a:fld id="{12571DBA-DE60-4731-B773-47AAA185C143}" type="datetimeFigureOut">
               <a:rPr lang="en-US" smtClean="0"/>
-              <a:t>1/9/2017</a:t>
+              <a:t>1/10/2017</a:t>
             </a:fld>
             <a:endParaRPr lang="en-US" dirty="0"/>
           </a:p>
@@ -4060,7 +4059,7 @@
           <a:p>
             <a:fld id="{4F170639-886C-4FCF-9EAB-ABB5DA3F3F4A}" type="datetimeFigureOut">
               <a:rPr lang="en-US" smtClean="0"/>
-              <a:t>1/9/2017</a:t>
+              <a:t>1/10/2017</a:t>
             </a:fld>
             <a:endParaRPr lang="en-US" dirty="0"/>
           </a:p>
@@ -4231,7 +4230,7 @@
           <a:p>
             <a:fld id="{34C4A628-C83B-4C66-83F4-1711CE3738FD}" type="datetimeFigureOut">
               <a:rPr lang="en-US" smtClean="0"/>
-              <a:t>1/9/2017</a:t>
+              <a:t>1/10/2017</a:t>
             </a:fld>
             <a:endParaRPr lang="en-US" dirty="0"/>
           </a:p>
@@ -4585,7 +4584,7 @@
           <a:p>
             <a:fld id="{B88C1D73-9400-43CA-A37F-F9B7D00DE14C}" type="datetimeFigureOut">
               <a:rPr lang="en-US" smtClean="0"/>
-              <a:t>1/9/2017</a:t>
+              <a:t>1/10/2017</a:t>
             </a:fld>
             <a:endParaRPr lang="en-US" dirty="0"/>
           </a:p>
@@ -4962,7 +4961,7 @@
           <a:p>
             <a:fld id="{188B7711-B905-4633-B4D7-6F3A49A2E7D9}" type="datetimeFigureOut">
               <a:rPr lang="en-US" smtClean="0"/>
-              <a:t>1/9/2017</a:t>
+              <a:t>1/10/2017</a:t>
             </a:fld>
             <a:endParaRPr lang="en-US" dirty="0"/>
           </a:p>
@@ -5250,7 +5249,7 @@
             <a:fld id="{89C235CF-BDA2-4E7E-8BBD-350479985E74}" type="datetimeFigureOut">
               <a:rPr lang="en-US" smtClean="0"/>
               <a:pPr/>
-              <a:t>1/9/2017</a:t>
+              <a:t>1/10/2017</a:t>
             </a:fld>
             <a:endParaRPr lang="en-US" dirty="0"/>
           </a:p>
@@ -7354,7 +7353,7 @@
           <a:p>
             <a:r>
               <a:rPr lang="da-DK" b="1" dirty="0"/>
-              <a:t>Økonomiske konsekvenser </a:t>
+              <a:t>Økonomi ved udvidelse af screeningsprogram</a:t>
             </a:r>
           </a:p>
           <a:p>

</xml_diff>

<commit_message>
ændret lidt på PP
</commit_message>
<xml_diff>
--- a/Præsentation_Eksamen.pptx
+++ b/Præsentation_Eksamen.pptx
@@ -1752,9 +1752,52 @@
             </a:r>
           </a:p>
           <a:p>
+            <a:endParaRPr lang="da-DK" baseline="0" dirty="0"/>
+          </a:p>
+          <a:p>
+            <a:pPr marL="0" marR="0" lvl="0" indent="0" algn="l" defTabSz="914400" rtl="0" eaLnBrk="1" fontAlgn="auto" latinLnBrk="0" hangingPunct="1">
+              <a:lnSpc>
+                <a:spcPct val="100000"/>
+              </a:lnSpc>
+              <a:spcBef>
+                <a:spcPts val="0"/>
+              </a:spcBef>
+              <a:spcAft>
+                <a:spcPts val="0"/>
+              </a:spcAft>
+              <a:buClrTx/>
+              <a:buSzTx/>
+              <a:buFontTx/>
+              <a:buNone/>
+              <a:tabLst/>
+              <a:defRPr/>
+            </a:pPr>
             <a:r>
               <a:rPr lang="da-DK" baseline="0" dirty="0"/>
-              <a:t>Omkostningerne for tid, indkøb mm. blev gjort op, og ud fra skemaet kan man se, at jo længere transporttid for radiologen, jo dyrere bliver scanningen. </a:t>
+              <a:t>Selve UR10 robotten koster tæt på de 200.000 kr. Derudover vil man skulle sætte penge af til at oplære radiografer, vedligeholdelse mm</a:t>
+            </a:r>
+          </a:p>
+          <a:p>
+            <a:pPr marL="0" marR="0" lvl="0" indent="0" algn="l" defTabSz="914400" rtl="0" eaLnBrk="1" fontAlgn="auto" latinLnBrk="0" hangingPunct="1">
+              <a:lnSpc>
+                <a:spcPct val="100000"/>
+              </a:lnSpc>
+              <a:spcBef>
+                <a:spcPts val="0"/>
+              </a:spcBef>
+              <a:spcAft>
+                <a:spcPts val="0"/>
+              </a:spcAft>
+              <a:buClrTx/>
+              <a:buSzTx/>
+              <a:buFontTx/>
+              <a:buNone/>
+              <a:tabLst/>
+              <a:defRPr/>
+            </a:pPr>
+            <a:r>
+              <a:rPr lang="da-DK" baseline="0" dirty="0"/>
+              <a:t>Omkostningerne for tid, indkøb mm. blev gjort op – 220.000 kroner, og ud fra skemaet kan man se, at jo længere transporttid for radiologen, jo dyrere bliver scanningen. </a:t>
             </a:r>
           </a:p>
           <a:p>
@@ -1787,18 +1830,6 @@
               <a:rPr lang="da-DK" baseline="0" dirty="0"/>
               <a:t> forskelle som tid for radiografer og radiologer. Tallene for den gennemsnitlige tid er et estimat af en radiolog og radiograf – men det ville styrke analysen at have flere radiologers estimat. </a:t>
             </a:r>
-          </a:p>
-          <a:p>
-            <a:endParaRPr lang="da-DK" baseline="0" dirty="0"/>
-          </a:p>
-          <a:p>
-            <a:r>
-              <a:rPr lang="da-DK" baseline="0" dirty="0"/>
-              <a:t>Selve UR10 robotten koster tæt på de 200.000 kr. Derudover vil man skulle sætte penge af til at oplære radiografer, vedligeholdelse mm</a:t>
-            </a:r>
-          </a:p>
-          <a:p>
-            <a:endParaRPr lang="da-DK" dirty="0"/>
           </a:p>
         </p:txBody>
       </p:sp>
@@ -8844,8 +8875,12 @@
               <a:buChar char="•"/>
             </a:pPr>
             <a:r>
+              <a:rPr lang="da-DK"/>
+              <a:t>Søren Pallesen </a:t>
+            </a:r>
+            <a:r>
               <a:rPr lang="da-DK" dirty="0"/>
-              <a:t>Pallesen og stifter af </a:t>
+              <a:t>og stifter af </a:t>
             </a:r>
             <a:r>
               <a:rPr lang="da-DK" dirty="0" err="1"/>
@@ -9363,14 +9398,8 @@
             </a:pPr>
             <a:r>
               <a:rPr lang="da-DK" dirty="0"/>
-              <a:t> Omkostninger til udstyr </a:t>
-            </a:r>
-          </a:p>
-          <a:p>
-            <a:pPr marL="0" indent="0">
-              <a:buNone/>
-            </a:pPr>
-            <a:endParaRPr lang="da-DK" dirty="0"/>
+              <a:t> Faste omkostninger til udstyr, opsætning etc.</a:t>
+            </a:r>
           </a:p>
         </p:txBody>
       </p:sp>

</xml_diff>